<commit_message>
adding architecture diagram updates
</commit_message>
<xml_diff>
--- a/docs/deployment_guide/images/salesforce-connect-appsync-rds-postgresql-architecture-diagram.pptx
+++ b/docs/deployment_guide/images/salesforce-connect-appsync-rds-postgresql-architecture-diagram.pptx
@@ -259,7 +259,7 @@
           <a:p>
             <a:fld id="{52D85F82-09A4-9042-8C44-5FA6EC1F91AD}" type="datetimeFigureOut">
               <a:rPr lang="en-US" smtClean="0"/>
-              <a:t>4/5/23</a:t>
+              <a:t>4/17/23</a:t>
             </a:fld>
             <a:endParaRPr lang="en-US"/>
           </a:p>
@@ -457,7 +457,7 @@
           <a:p>
             <a:fld id="{52D85F82-09A4-9042-8C44-5FA6EC1F91AD}" type="datetimeFigureOut">
               <a:rPr lang="en-US" smtClean="0"/>
-              <a:t>4/5/23</a:t>
+              <a:t>4/17/23</a:t>
             </a:fld>
             <a:endParaRPr lang="en-US"/>
           </a:p>
@@ -665,7 +665,7 @@
           <a:p>
             <a:fld id="{52D85F82-09A4-9042-8C44-5FA6EC1F91AD}" type="datetimeFigureOut">
               <a:rPr lang="en-US" smtClean="0"/>
-              <a:t>4/5/23</a:t>
+              <a:t>4/17/23</a:t>
             </a:fld>
             <a:endParaRPr lang="en-US"/>
           </a:p>
@@ -863,7 +863,7 @@
           <a:p>
             <a:fld id="{52D85F82-09A4-9042-8C44-5FA6EC1F91AD}" type="datetimeFigureOut">
               <a:rPr lang="en-US" smtClean="0"/>
-              <a:t>4/5/23</a:t>
+              <a:t>4/17/23</a:t>
             </a:fld>
             <a:endParaRPr lang="en-US"/>
           </a:p>
@@ -1138,7 +1138,7 @@
           <a:p>
             <a:fld id="{52D85F82-09A4-9042-8C44-5FA6EC1F91AD}" type="datetimeFigureOut">
               <a:rPr lang="en-US" smtClean="0"/>
-              <a:t>4/5/23</a:t>
+              <a:t>4/17/23</a:t>
             </a:fld>
             <a:endParaRPr lang="en-US"/>
           </a:p>
@@ -1403,7 +1403,7 @@
           <a:p>
             <a:fld id="{52D85F82-09A4-9042-8C44-5FA6EC1F91AD}" type="datetimeFigureOut">
               <a:rPr lang="en-US" smtClean="0"/>
-              <a:t>4/5/23</a:t>
+              <a:t>4/17/23</a:t>
             </a:fld>
             <a:endParaRPr lang="en-US"/>
           </a:p>
@@ -1815,7 +1815,7 @@
           <a:p>
             <a:fld id="{52D85F82-09A4-9042-8C44-5FA6EC1F91AD}" type="datetimeFigureOut">
               <a:rPr lang="en-US" smtClean="0"/>
-              <a:t>4/5/23</a:t>
+              <a:t>4/17/23</a:t>
             </a:fld>
             <a:endParaRPr lang="en-US"/>
           </a:p>
@@ -1956,7 +1956,7 @@
           <a:p>
             <a:fld id="{52D85F82-09A4-9042-8C44-5FA6EC1F91AD}" type="datetimeFigureOut">
               <a:rPr lang="en-US" smtClean="0"/>
-              <a:t>4/5/23</a:t>
+              <a:t>4/17/23</a:t>
             </a:fld>
             <a:endParaRPr lang="en-US"/>
           </a:p>
@@ -2069,7 +2069,7 @@
           <a:p>
             <a:fld id="{52D85F82-09A4-9042-8C44-5FA6EC1F91AD}" type="datetimeFigureOut">
               <a:rPr lang="en-US" smtClean="0"/>
-              <a:t>4/5/23</a:t>
+              <a:t>4/17/23</a:t>
             </a:fld>
             <a:endParaRPr lang="en-US"/>
           </a:p>
@@ -2380,7 +2380,7 @@
           <a:p>
             <a:fld id="{52D85F82-09A4-9042-8C44-5FA6EC1F91AD}" type="datetimeFigureOut">
               <a:rPr lang="en-US" smtClean="0"/>
-              <a:t>4/5/23</a:t>
+              <a:t>4/17/23</a:t>
             </a:fld>
             <a:endParaRPr lang="en-US"/>
           </a:p>
@@ -2668,7 +2668,7 @@
           <a:p>
             <a:fld id="{52D85F82-09A4-9042-8C44-5FA6EC1F91AD}" type="datetimeFigureOut">
               <a:rPr lang="en-US" smtClean="0"/>
-              <a:t>4/5/23</a:t>
+              <a:t>4/17/23</a:t>
             </a:fld>
             <a:endParaRPr lang="en-US"/>
           </a:p>
@@ -2909,7 +2909,7 @@
           <a:p>
             <a:fld id="{52D85F82-09A4-9042-8C44-5FA6EC1F91AD}" type="datetimeFigureOut">
               <a:rPr lang="en-US" smtClean="0"/>
-              <a:t>4/5/23</a:t>
+              <a:t>4/17/23</a:t>
             </a:fld>
             <a:endParaRPr lang="en-US"/>
           </a:p>
@@ -3423,10 +3423,10 @@
       </p:pic>
       <p:pic>
         <p:nvPicPr>
-          <p:cNvPr id="6" name="Graphic 10">
-            <a:extLst>
-              <a:ext uri="{FF2B5EF4-FFF2-40B4-BE49-F238E27FC236}">
-                <a16:creationId xmlns:a16="http://schemas.microsoft.com/office/drawing/2014/main" id="{067A07AB-46AD-F830-5490-93062FE0EE94}"/>
+          <p:cNvPr id="8" name="Graphic 17">
+            <a:extLst>
+              <a:ext uri="{FF2B5EF4-FFF2-40B4-BE49-F238E27FC236}">
+                <a16:creationId xmlns:a16="http://schemas.microsoft.com/office/drawing/2014/main" id="{078CCF7D-2D46-46B7-2F4D-DA45F0AD4DE6}"/>
               </a:ext>
             </a:extLst>
           </p:cNvPr>
@@ -3437,126 +3437,6 @@
         </p:nvPicPr>
         <p:blipFill>
           <a:blip r:embed="rId4">
-            <a:extLst>
-              <a:ext uri="{28A0092B-C50C-407E-A947-70E740481C1C}">
-                <a14:useLocalDpi xmlns:a14="http://schemas.microsoft.com/office/drawing/2010/main" val="0"/>
-              </a:ext>
-            </a:extLst>
-          </a:blip>
-          <a:srcRect/>
-          <a:stretch>
-            <a:fillRect/>
-          </a:stretch>
-        </p:blipFill>
-        <p:spPr bwMode="auto">
-          <a:xfrm>
-            <a:off x="6934754" y="2342090"/>
-            <a:ext cx="762000" cy="762000"/>
-          </a:xfrm>
-          <a:prstGeom prst="rect">
-            <a:avLst/>
-          </a:prstGeom>
-          <a:noFill/>
-          <a:ln>
-            <a:noFill/>
-          </a:ln>
-          <a:extLst>
-            <a:ext uri="{909E8E84-426E-40DD-AFC4-6F175D3DCCD1}">
-              <a14:hiddenFill xmlns:a14="http://schemas.microsoft.com/office/drawing/2010/main">
-                <a:solidFill>
-                  <a:srgbClr val="FFFFFF"/>
-                </a:solidFill>
-              </a14:hiddenFill>
-            </a:ext>
-            <a:ext uri="{91240B29-F687-4F45-9708-019B960494DF}">
-              <a14:hiddenLine xmlns:a14="http://schemas.microsoft.com/office/drawing/2010/main" w="9525">
-                <a:solidFill>
-                  <a:srgbClr val="000000"/>
-                </a:solidFill>
-                <a:miter lim="800000"/>
-                <a:headEnd/>
-                <a:tailEnd/>
-              </a14:hiddenLine>
-            </a:ext>
-          </a:extLst>
-        </p:spPr>
-      </p:pic>
-      <p:pic>
-        <p:nvPicPr>
-          <p:cNvPr id="7" name="Graphic 15">
-            <a:extLst>
-              <a:ext uri="{FF2B5EF4-FFF2-40B4-BE49-F238E27FC236}">
-                <a16:creationId xmlns:a16="http://schemas.microsoft.com/office/drawing/2014/main" id="{9AE98A53-1800-E6C6-E101-EF6214A65567}"/>
-              </a:ext>
-            </a:extLst>
-          </p:cNvPr>
-          <p:cNvPicPr>
-            <a:picLocks noChangeAspect="1" noChangeArrowheads="1"/>
-          </p:cNvPicPr>
-          <p:nvPr/>
-        </p:nvPicPr>
-        <p:blipFill>
-          <a:blip r:embed="rId5">
-            <a:extLst>
-              <a:ext uri="{28A0092B-C50C-407E-A947-70E740481C1C}">
-                <a14:useLocalDpi xmlns:a14="http://schemas.microsoft.com/office/drawing/2010/main" val="0"/>
-              </a:ext>
-            </a:extLst>
-          </a:blip>
-          <a:srcRect/>
-          <a:stretch>
-            <a:fillRect/>
-          </a:stretch>
-        </p:blipFill>
-        <p:spPr bwMode="auto">
-          <a:xfrm>
-            <a:off x="8765928" y="2328862"/>
-            <a:ext cx="762000" cy="762000"/>
-          </a:xfrm>
-          <a:prstGeom prst="rect">
-            <a:avLst/>
-          </a:prstGeom>
-          <a:noFill/>
-          <a:ln>
-            <a:noFill/>
-          </a:ln>
-          <a:extLst>
-            <a:ext uri="{909E8E84-426E-40DD-AFC4-6F175D3DCCD1}">
-              <a14:hiddenFill xmlns:a14="http://schemas.microsoft.com/office/drawing/2010/main">
-                <a:solidFill>
-                  <a:srgbClr val="FFFFFF"/>
-                </a:solidFill>
-              </a14:hiddenFill>
-            </a:ext>
-            <a:ext uri="{91240B29-F687-4F45-9708-019B960494DF}">
-              <a14:hiddenLine xmlns:a14="http://schemas.microsoft.com/office/drawing/2010/main" w="9525">
-                <a:solidFill>
-                  <a:srgbClr val="000000"/>
-                </a:solidFill>
-                <a:miter lim="800000"/>
-                <a:headEnd/>
-                <a:tailEnd/>
-              </a14:hiddenLine>
-            </a:ext>
-          </a:extLst>
-        </p:spPr>
-      </p:pic>
-      <p:pic>
-        <p:nvPicPr>
-          <p:cNvPr id="8" name="Graphic 17">
-            <a:extLst>
-              <a:ext uri="{FF2B5EF4-FFF2-40B4-BE49-F238E27FC236}">
-                <a16:creationId xmlns:a16="http://schemas.microsoft.com/office/drawing/2014/main" id="{078CCF7D-2D46-46B7-2F4D-DA45F0AD4DE6}"/>
-              </a:ext>
-            </a:extLst>
-          </p:cNvPr>
-          <p:cNvPicPr>
-            <a:picLocks noChangeAspect="1" noChangeArrowheads="1"/>
-          </p:cNvPicPr>
-          <p:nvPr/>
-        </p:nvPicPr>
-        <p:blipFill>
-          <a:blip r:embed="rId6">
             <a:extLst>
               <a:ext uri="{28A0092B-C50C-407E-A947-70E740481C1C}">
                 <a14:useLocalDpi xmlns:a14="http://schemas.microsoft.com/office/drawing/2010/main" val="0"/>
@@ -3616,7 +3496,7 @@
           <p:nvPr/>
         </p:nvPicPr>
         <p:blipFill>
-          <a:blip r:embed="rId7">
+          <a:blip r:embed="rId5">
             <a:extLst>
               <a:ext uri="{28A0092B-C50C-407E-A947-70E740481C1C}">
                 <a14:useLocalDpi xmlns:a14="http://schemas.microsoft.com/office/drawing/2010/main" val="0"/>
@@ -3630,7 +3510,7 @@
         </p:blipFill>
         <p:spPr bwMode="auto">
           <a:xfrm>
-            <a:off x="8819234" y="4473034"/>
+            <a:off x="9657091" y="4455142"/>
             <a:ext cx="762000" cy="762000"/>
           </a:xfrm>
           <a:prstGeom prst="rect">
@@ -3856,14 +3736,13 @@
           <p:cNvCxnSpPr>
             <a:cxnSpLocks/>
             <a:stCxn id="4" idx="3"/>
-            <a:endCxn id="12" idx="3"/>
           </p:cNvCxnSpPr>
           <p:nvPr/>
         </p:nvCxnSpPr>
         <p:spPr>
           <a:xfrm>
             <a:off x="1481740" y="2712490"/>
-            <a:ext cx="810658" cy="10651"/>
+            <a:ext cx="744274" cy="10600"/>
           </a:xfrm>
           <a:prstGeom prst="straightConnector1">
             <a:avLst/>
@@ -3902,15 +3781,13 @@
           </p:cNvPr>
           <p:cNvCxnSpPr>
             <a:cxnSpLocks/>
-            <a:stCxn id="12" idx="0"/>
-            <a:endCxn id="5" idx="1"/>
           </p:cNvCxnSpPr>
           <p:nvPr/>
         </p:nvCxnSpPr>
         <p:spPr>
-          <a:xfrm>
-            <a:off x="3170222" y="2723141"/>
-            <a:ext cx="1605275" cy="2627"/>
+          <a:xfrm flipV="1">
+            <a:off x="3298595" y="2723141"/>
+            <a:ext cx="1382880" cy="1313"/>
           </a:xfrm>
           <a:prstGeom prst="straightConnector1">
             <a:avLst/>
@@ -3949,15 +3826,13 @@
           </p:cNvPr>
           <p:cNvCxnSpPr>
             <a:cxnSpLocks/>
-            <a:stCxn id="5" idx="3"/>
-            <a:endCxn id="6" idx="1"/>
           </p:cNvCxnSpPr>
           <p:nvPr/>
         </p:nvCxnSpPr>
         <p:spPr>
-          <a:xfrm flipV="1">
-            <a:off x="5537497" y="2723090"/>
-            <a:ext cx="1397257" cy="2678"/>
+          <a:xfrm>
+            <a:off x="5625548" y="2725768"/>
+            <a:ext cx="1359851" cy="0"/>
           </a:xfrm>
           <a:prstGeom prst="straightConnector1">
             <a:avLst/>
@@ -3996,15 +3871,13 @@
           </p:cNvPr>
           <p:cNvCxnSpPr>
             <a:cxnSpLocks/>
-            <a:stCxn id="6" idx="3"/>
-            <a:endCxn id="7" idx="1"/>
           </p:cNvCxnSpPr>
           <p:nvPr/>
         </p:nvCxnSpPr>
         <p:spPr>
-          <a:xfrm flipV="1">
-            <a:off x="7696754" y="2709862"/>
-            <a:ext cx="1069174" cy="13228"/>
+          <a:xfrm>
+            <a:off x="7615101" y="2723090"/>
+            <a:ext cx="1051508" cy="0"/>
           </a:xfrm>
           <a:prstGeom prst="straightConnector1">
             <a:avLst/>
@@ -4043,15 +3916,13 @@
           </p:cNvPr>
           <p:cNvCxnSpPr>
             <a:cxnSpLocks/>
-            <a:stCxn id="8" idx="1"/>
-            <a:endCxn id="7" idx="3"/>
           </p:cNvCxnSpPr>
           <p:nvPr/>
         </p:nvCxnSpPr>
         <p:spPr>
           <a:xfrm flipH="1" flipV="1">
-            <a:off x="9527928" y="2709862"/>
-            <a:ext cx="973686" cy="13228"/>
+            <a:off x="9428609" y="2723090"/>
+            <a:ext cx="990482" cy="1364"/>
           </a:xfrm>
           <a:prstGeom prst="straightConnector1">
             <a:avLst/>
@@ -4160,10 +4031,10 @@
           <p:nvPr/>
         </p:nvPicPr>
         <p:blipFill>
-          <a:blip r:embed="rId8">
+          <a:blip r:embed="rId6">
             <a:extLst>
               <a:ext uri="{96DAC541-7B7A-43D3-8B79-37D633B846F1}">
-                <asvg:svgBlip xmlns:asvg="http://schemas.microsoft.com/office/drawing/2016/SVG/main" r:embed="rId9"/>
+                <asvg:svgBlip xmlns:asvg="http://schemas.microsoft.com/office/drawing/2016/SVG/main" r:embed="rId7"/>
               </a:ext>
             </a:extLst>
           </a:blip>
@@ -4196,7 +4067,7 @@
         </p:nvCxnSpPr>
         <p:spPr>
           <a:xfrm flipV="1">
-            <a:off x="7842800" y="2709862"/>
+            <a:off x="7952130" y="2723090"/>
             <a:ext cx="0" cy="2144172"/>
           </a:xfrm>
           <a:prstGeom prst="straightConnector1">
@@ -4281,14 +4152,13 @@
           </p:cNvPr>
           <p:cNvCxnSpPr>
             <a:cxnSpLocks/>
-            <a:stCxn id="9" idx="3"/>
           </p:cNvCxnSpPr>
           <p:nvPr/>
         </p:nvCxnSpPr>
         <p:spPr>
           <a:xfrm>
-            <a:off x="9581234" y="4854034"/>
-            <a:ext cx="2132329" cy="0"/>
+            <a:off x="10451055" y="4854034"/>
+            <a:ext cx="1262508" cy="0"/>
           </a:xfrm>
           <a:prstGeom prst="straightConnector1">
             <a:avLst/>
@@ -4331,10 +4201,10 @@
           <p:nvPr/>
         </p:nvPicPr>
         <p:blipFill>
-          <a:blip r:embed="rId10">
+          <a:blip r:embed="rId8">
             <a:extLst>
               <a:ext uri="{96DAC541-7B7A-43D3-8B79-37D633B846F1}">
-                <asvg:svgBlip xmlns:asvg="http://schemas.microsoft.com/office/drawing/2016/SVG/main" r:embed="rId11"/>
+                <asvg:svgBlip xmlns:asvg="http://schemas.microsoft.com/office/drawing/2016/SVG/main" r:embed="rId9"/>
               </a:ext>
             </a:extLst>
           </a:blip>
@@ -4601,7 +4471,7 @@
         </p:nvSpPr>
         <p:spPr bwMode="auto">
           <a:xfrm>
-            <a:off x="6166450" y="3090218"/>
+            <a:off x="6175630" y="3101513"/>
             <a:ext cx="2292350" cy="276999"/>
           </a:xfrm>
           <a:prstGeom prst="rect">
@@ -4741,7 +4611,7 @@
                 <a:ea typeface="Amazon Ember" panose="020B0603020204020204" pitchFamily="34" charset="0"/>
                 <a:cs typeface="Arial" panose="020B0604020202020204" pitchFamily="34" charset="0"/>
               </a:rPr>
-              <a:t>AWS Lambda</a:t>
+              <a:t>Lambda function</a:t>
             </a:r>
           </a:p>
         </p:txBody>
@@ -4762,7 +4632,7 @@
         </p:nvSpPr>
         <p:spPr bwMode="auto">
           <a:xfrm>
-            <a:off x="8054059" y="3087871"/>
+            <a:off x="7926393" y="3106618"/>
             <a:ext cx="2292350" cy="276999"/>
           </a:xfrm>
           <a:prstGeom prst="rect">
@@ -4902,7 +4772,7 @@
                 <a:ea typeface="Amazon Ember" panose="020B0603020204020204" pitchFamily="34" charset="0"/>
                 <a:cs typeface="Arial" panose="020B0604020202020204" pitchFamily="34" charset="0"/>
               </a:rPr>
-              <a:t>AWS Systems Manager</a:t>
+              <a:t>Parameter Store</a:t>
             </a:r>
           </a:p>
         </p:txBody>
@@ -4918,14 +4788,13 @@
           </p:cNvPr>
           <p:cNvCxnSpPr>
             <a:cxnSpLocks/>
-            <a:stCxn id="8" idx="3"/>
           </p:cNvCxnSpPr>
           <p:nvPr/>
         </p:nvCxnSpPr>
         <p:spPr>
-          <a:xfrm>
-            <a:off x="11263614" y="2723090"/>
-            <a:ext cx="449949" cy="0"/>
+          <a:xfrm flipV="1">
+            <a:off x="11360426" y="2723090"/>
+            <a:ext cx="353137" cy="1364"/>
           </a:xfrm>
           <a:prstGeom prst="straightConnector1">
             <a:avLst/>
@@ -4969,7 +4838,7 @@
         </p:nvSpPr>
         <p:spPr bwMode="auto">
           <a:xfrm>
-            <a:off x="9736439" y="3085524"/>
+            <a:off x="9736438" y="3104090"/>
             <a:ext cx="2292350" cy="276999"/>
           </a:xfrm>
           <a:prstGeom prst="rect">
@@ -5130,7 +4999,7 @@
         </p:nvSpPr>
         <p:spPr bwMode="auto">
           <a:xfrm>
-            <a:off x="7641744" y="5224080"/>
+            <a:off x="8532907" y="5228522"/>
             <a:ext cx="3010367" cy="276999"/>
           </a:xfrm>
           <a:prstGeom prst="rect">
@@ -5445,7 +5314,7 @@
         </p:nvSpPr>
         <p:spPr>
           <a:xfrm>
-            <a:off x="9320007" y="4542213"/>
+            <a:off x="10229138" y="4549555"/>
             <a:ext cx="1637020" cy="261610"/>
           </a:xfrm>
           <a:prstGeom prst="rect">
@@ -5484,7 +5353,7 @@
         </p:nvSpPr>
         <p:spPr>
           <a:xfrm>
-            <a:off x="7509908" y="4550787"/>
+            <a:off x="7889021" y="4560705"/>
             <a:ext cx="1637020" cy="261610"/>
           </a:xfrm>
           <a:prstGeom prst="rect">
@@ -5520,14 +5389,13 @@
           </p:cNvPr>
           <p:cNvCxnSpPr>
             <a:cxnSpLocks/>
-            <a:stCxn id="9" idx="1"/>
           </p:cNvCxnSpPr>
           <p:nvPr/>
         </p:nvCxnSpPr>
         <p:spPr>
           <a:xfrm flipH="1">
-            <a:off x="7842799" y="4854034"/>
-            <a:ext cx="976435" cy="0"/>
+            <a:off x="7952129" y="4867262"/>
+            <a:ext cx="1625455" cy="0"/>
           </a:xfrm>
           <a:prstGeom prst="straightConnector1">
             <a:avLst/>
@@ -5555,6 +5423,126 @@
           </a:fontRef>
         </p:style>
       </p:cxnSp>
+      <p:pic>
+        <p:nvPicPr>
+          <p:cNvPr id="3" name="Graphic 13">
+            <a:extLst>
+              <a:ext uri="{FF2B5EF4-FFF2-40B4-BE49-F238E27FC236}">
+                <a16:creationId xmlns:a16="http://schemas.microsoft.com/office/drawing/2014/main" id="{D7606CCE-AF8A-5F23-29F4-C96CBBE4B546}"/>
+              </a:ext>
+            </a:extLst>
+          </p:cNvPr>
+          <p:cNvPicPr>
+            <a:picLocks noChangeAspect="1" noChangeArrowheads="1"/>
+          </p:cNvPicPr>
+          <p:nvPr/>
+        </p:nvPicPr>
+        <p:blipFill>
+          <a:blip r:embed="rId10">
+            <a:extLst>
+              <a:ext uri="{28A0092B-C50C-407E-A947-70E740481C1C}">
+                <a14:useLocalDpi xmlns:a14="http://schemas.microsoft.com/office/drawing/2010/main" val="0"/>
+              </a:ext>
+            </a:extLst>
+          </a:blip>
+          <a:srcRect/>
+          <a:stretch>
+            <a:fillRect/>
+          </a:stretch>
+        </p:blipFill>
+        <p:spPr bwMode="auto">
+          <a:xfrm>
+            <a:off x="7086545" y="2480437"/>
+            <a:ext cx="457200" cy="457200"/>
+          </a:xfrm>
+          <a:prstGeom prst="rect">
+            <a:avLst/>
+          </a:prstGeom>
+          <a:noFill/>
+          <a:ln>
+            <a:noFill/>
+          </a:ln>
+          <a:extLst>
+            <a:ext uri="{909E8E84-426E-40DD-AFC4-6F175D3DCCD1}">
+              <a14:hiddenFill xmlns:a14="http://schemas.microsoft.com/office/drawing/2010/main">
+                <a:solidFill>
+                  <a:srgbClr val="FFFFFF"/>
+                </a:solidFill>
+              </a14:hiddenFill>
+            </a:ext>
+            <a:ext uri="{91240B29-F687-4F45-9708-019B960494DF}">
+              <a14:hiddenLine xmlns:a14="http://schemas.microsoft.com/office/drawing/2010/main" w="9525">
+                <a:solidFill>
+                  <a:srgbClr val="000000"/>
+                </a:solidFill>
+                <a:miter lim="800000"/>
+                <a:headEnd/>
+                <a:tailEnd/>
+              </a14:hiddenLine>
+            </a:ext>
+          </a:extLst>
+        </p:spPr>
+      </p:pic>
+      <p:pic>
+        <p:nvPicPr>
+          <p:cNvPr id="22" name="Graphic 26">
+            <a:extLst>
+              <a:ext uri="{FF2B5EF4-FFF2-40B4-BE49-F238E27FC236}">
+                <a16:creationId xmlns:a16="http://schemas.microsoft.com/office/drawing/2014/main" id="{DF168994-2E6A-93EB-C9DB-D1BE11B4EF54}"/>
+              </a:ext>
+            </a:extLst>
+          </p:cNvPr>
+          <p:cNvPicPr>
+            <a:picLocks noChangeAspect="1" noChangeArrowheads="1"/>
+          </p:cNvPicPr>
+          <p:nvPr/>
+        </p:nvPicPr>
+        <p:blipFill>
+          <a:blip r:embed="rId11">
+            <a:extLst>
+              <a:ext uri="{28A0092B-C50C-407E-A947-70E740481C1C}">
+                <a14:useLocalDpi xmlns:a14="http://schemas.microsoft.com/office/drawing/2010/main" val="0"/>
+              </a:ext>
+            </a:extLst>
+          </a:blip>
+          <a:srcRect/>
+          <a:stretch>
+            <a:fillRect/>
+          </a:stretch>
+        </p:blipFill>
+        <p:spPr bwMode="auto">
+          <a:xfrm>
+            <a:off x="8843968" y="2466053"/>
+            <a:ext cx="457200" cy="457200"/>
+          </a:xfrm>
+          <a:prstGeom prst="rect">
+            <a:avLst/>
+          </a:prstGeom>
+          <a:noFill/>
+          <a:ln>
+            <a:noFill/>
+          </a:ln>
+          <a:extLst>
+            <a:ext uri="{909E8E84-426E-40DD-AFC4-6F175D3DCCD1}">
+              <a14:hiddenFill xmlns:a14="http://schemas.microsoft.com/office/drawing/2010/main">
+                <a:solidFill>
+                  <a:srgbClr val="FFFFFF"/>
+                </a:solidFill>
+              </a14:hiddenFill>
+            </a:ext>
+            <a:ext uri="{91240B29-F687-4F45-9708-019B960494DF}">
+              <a14:hiddenLine xmlns:a14="http://schemas.microsoft.com/office/drawing/2010/main" w="9525">
+                <a:solidFill>
+                  <a:srgbClr val="000000"/>
+                </a:solidFill>
+                <a:miter lim="800000"/>
+                <a:headEnd/>
+                <a:tailEnd/>
+              </a14:hiddenLine>
+            </a:ext>
+          </a:extLst>
+        </p:spPr>
+      </p:pic>
     </p:spTree>
     <p:extLst>
       <p:ext uri="{BB962C8B-B14F-4D97-AF65-F5344CB8AC3E}">

</xml_diff>

<commit_message>
add architecture bullet list and updated diagram v1
</commit_message>
<xml_diff>
--- a/docs/deployment_guide/images/salesforce-connect-appsync-rds-postgresql-architecture-diagram.pptx
+++ b/docs/deployment_guide/images/salesforce-connect-appsync-rds-postgresql-architecture-diagram.pptx
@@ -259,7 +259,7 @@
           <a:p>
             <a:fld id="{52D85F82-09A4-9042-8C44-5FA6EC1F91AD}" type="datetimeFigureOut">
               <a:rPr lang="en-US" smtClean="0"/>
-              <a:t>4/17/23</a:t>
+              <a:t>5/5/23</a:t>
             </a:fld>
             <a:endParaRPr lang="en-US"/>
           </a:p>
@@ -457,7 +457,7 @@
           <a:p>
             <a:fld id="{52D85F82-09A4-9042-8C44-5FA6EC1F91AD}" type="datetimeFigureOut">
               <a:rPr lang="en-US" smtClean="0"/>
-              <a:t>4/17/23</a:t>
+              <a:t>5/5/23</a:t>
             </a:fld>
             <a:endParaRPr lang="en-US"/>
           </a:p>
@@ -665,7 +665,7 @@
           <a:p>
             <a:fld id="{52D85F82-09A4-9042-8C44-5FA6EC1F91AD}" type="datetimeFigureOut">
               <a:rPr lang="en-US" smtClean="0"/>
-              <a:t>4/17/23</a:t>
+              <a:t>5/5/23</a:t>
             </a:fld>
             <a:endParaRPr lang="en-US"/>
           </a:p>
@@ -863,7 +863,7 @@
           <a:p>
             <a:fld id="{52D85F82-09A4-9042-8C44-5FA6EC1F91AD}" type="datetimeFigureOut">
               <a:rPr lang="en-US" smtClean="0"/>
-              <a:t>4/17/23</a:t>
+              <a:t>5/5/23</a:t>
             </a:fld>
             <a:endParaRPr lang="en-US"/>
           </a:p>
@@ -1138,7 +1138,7 @@
           <a:p>
             <a:fld id="{52D85F82-09A4-9042-8C44-5FA6EC1F91AD}" type="datetimeFigureOut">
               <a:rPr lang="en-US" smtClean="0"/>
-              <a:t>4/17/23</a:t>
+              <a:t>5/5/23</a:t>
             </a:fld>
             <a:endParaRPr lang="en-US"/>
           </a:p>
@@ -1403,7 +1403,7 @@
           <a:p>
             <a:fld id="{52D85F82-09A4-9042-8C44-5FA6EC1F91AD}" type="datetimeFigureOut">
               <a:rPr lang="en-US" smtClean="0"/>
-              <a:t>4/17/23</a:t>
+              <a:t>5/5/23</a:t>
             </a:fld>
             <a:endParaRPr lang="en-US"/>
           </a:p>
@@ -1815,7 +1815,7 @@
           <a:p>
             <a:fld id="{52D85F82-09A4-9042-8C44-5FA6EC1F91AD}" type="datetimeFigureOut">
               <a:rPr lang="en-US" smtClean="0"/>
-              <a:t>4/17/23</a:t>
+              <a:t>5/5/23</a:t>
             </a:fld>
             <a:endParaRPr lang="en-US"/>
           </a:p>
@@ -1956,7 +1956,7 @@
           <a:p>
             <a:fld id="{52D85F82-09A4-9042-8C44-5FA6EC1F91AD}" type="datetimeFigureOut">
               <a:rPr lang="en-US" smtClean="0"/>
-              <a:t>4/17/23</a:t>
+              <a:t>5/5/23</a:t>
             </a:fld>
             <a:endParaRPr lang="en-US"/>
           </a:p>
@@ -2069,7 +2069,7 @@
           <a:p>
             <a:fld id="{52D85F82-09A4-9042-8C44-5FA6EC1F91AD}" type="datetimeFigureOut">
               <a:rPr lang="en-US" smtClean="0"/>
-              <a:t>4/17/23</a:t>
+              <a:t>5/5/23</a:t>
             </a:fld>
             <a:endParaRPr lang="en-US"/>
           </a:p>
@@ -2380,7 +2380,7 @@
           <a:p>
             <a:fld id="{52D85F82-09A4-9042-8C44-5FA6EC1F91AD}" type="datetimeFigureOut">
               <a:rPr lang="en-US" smtClean="0"/>
-              <a:t>4/17/23</a:t>
+              <a:t>5/5/23</a:t>
             </a:fld>
             <a:endParaRPr lang="en-US"/>
           </a:p>
@@ -2668,7 +2668,7 @@
           <a:p>
             <a:fld id="{52D85F82-09A4-9042-8C44-5FA6EC1F91AD}" type="datetimeFigureOut">
               <a:rPr lang="en-US" smtClean="0"/>
-              <a:t>4/17/23</a:t>
+              <a:t>5/5/23</a:t>
             </a:fld>
             <a:endParaRPr lang="en-US"/>
           </a:p>
@@ -2909,7 +2909,7 @@
           <a:p>
             <a:fld id="{52D85F82-09A4-9042-8C44-5FA6EC1F91AD}" type="datetimeFigureOut">
               <a:rPr lang="en-US" smtClean="0"/>
-              <a:t>4/17/23</a:t>
+              <a:t>5/5/23</a:t>
             </a:fld>
             <a:endParaRPr lang="en-US"/>
           </a:p>
@@ -3390,7 +3390,7 @@
         </p:blipFill>
         <p:spPr bwMode="auto">
           <a:xfrm>
-            <a:off x="4775497" y="2344768"/>
+            <a:off x="5593583" y="2355777"/>
             <a:ext cx="762000" cy="762000"/>
           </a:xfrm>
           <a:prstGeom prst="rect">
@@ -3423,10 +3423,10 @@
       </p:pic>
       <p:pic>
         <p:nvPicPr>
-          <p:cNvPr id="8" name="Graphic 17">
-            <a:extLst>
-              <a:ext uri="{FF2B5EF4-FFF2-40B4-BE49-F238E27FC236}">
-                <a16:creationId xmlns:a16="http://schemas.microsoft.com/office/drawing/2014/main" id="{078CCF7D-2D46-46B7-2F4D-DA45F0AD4DE6}"/>
+          <p:cNvPr id="9" name="Graphic 6">
+            <a:extLst>
+              <a:ext uri="{FF2B5EF4-FFF2-40B4-BE49-F238E27FC236}">
+                <a16:creationId xmlns:a16="http://schemas.microsoft.com/office/drawing/2014/main" id="{1FC6C73B-96BB-F6DF-1333-5082C56B6654}"/>
               </a:ext>
             </a:extLst>
           </p:cNvPr>
@@ -3450,67 +3450,7 @@
         </p:blipFill>
         <p:spPr bwMode="auto">
           <a:xfrm>
-            <a:off x="10501614" y="2342090"/>
-            <a:ext cx="762000" cy="762000"/>
-          </a:xfrm>
-          <a:prstGeom prst="rect">
-            <a:avLst/>
-          </a:prstGeom>
-          <a:noFill/>
-          <a:ln>
-            <a:noFill/>
-          </a:ln>
-          <a:extLst>
-            <a:ext uri="{909E8E84-426E-40DD-AFC4-6F175D3DCCD1}">
-              <a14:hiddenFill xmlns:a14="http://schemas.microsoft.com/office/drawing/2010/main">
-                <a:solidFill>
-                  <a:srgbClr val="FFFFFF"/>
-                </a:solidFill>
-              </a14:hiddenFill>
-            </a:ext>
-            <a:ext uri="{91240B29-F687-4F45-9708-019B960494DF}">
-              <a14:hiddenLine xmlns:a14="http://schemas.microsoft.com/office/drawing/2010/main" w="9525">
-                <a:solidFill>
-                  <a:srgbClr val="000000"/>
-                </a:solidFill>
-                <a:miter lim="800000"/>
-                <a:headEnd/>
-                <a:tailEnd/>
-              </a14:hiddenLine>
-            </a:ext>
-          </a:extLst>
-        </p:spPr>
-      </p:pic>
-      <p:pic>
-        <p:nvPicPr>
-          <p:cNvPr id="9" name="Graphic 6">
-            <a:extLst>
-              <a:ext uri="{FF2B5EF4-FFF2-40B4-BE49-F238E27FC236}">
-                <a16:creationId xmlns:a16="http://schemas.microsoft.com/office/drawing/2014/main" id="{1FC6C73B-96BB-F6DF-1333-5082C56B6654}"/>
-              </a:ext>
-            </a:extLst>
-          </p:cNvPr>
-          <p:cNvPicPr>
-            <a:picLocks noChangeAspect="1" noChangeArrowheads="1"/>
-          </p:cNvPicPr>
-          <p:nvPr/>
-        </p:nvPicPr>
-        <p:blipFill>
-          <a:blip r:embed="rId5">
-            <a:extLst>
-              <a:ext uri="{28A0092B-C50C-407E-A947-70E740481C1C}">
-                <a14:useLocalDpi xmlns:a14="http://schemas.microsoft.com/office/drawing/2010/main" val="0"/>
-              </a:ext>
-            </a:extLst>
-          </a:blip>
-          <a:srcRect/>
-          <a:stretch>
-            <a:fillRect/>
-          </a:stretch>
-        </p:blipFill>
-        <p:spPr bwMode="auto">
-          <a:xfrm>
-            <a:off x="9657091" y="4455142"/>
+            <a:off x="8559703" y="4310040"/>
             <a:ext cx="762000" cy="762000"/>
           </a:xfrm>
           <a:prstGeom prst="rect">
@@ -3614,8 +3554,8 @@
         </p:nvSpPr>
         <p:spPr>
           <a:xfrm>
-            <a:off x="301204" y="1419139"/>
-            <a:ext cx="3123068" cy="4209734"/>
+            <a:off x="301204" y="905983"/>
+            <a:ext cx="3123068" cy="4722890"/>
           </a:xfrm>
           <a:prstGeom prst="rect">
             <a:avLst/>
@@ -3786,8 +3726,8 @@
         </p:nvCxnSpPr>
         <p:spPr>
           <a:xfrm flipV="1">
-            <a:off x="3298595" y="2723141"/>
-            <a:ext cx="1382880" cy="1313"/>
+            <a:off x="3298595" y="2722169"/>
+            <a:ext cx="2212674" cy="2285"/>
           </a:xfrm>
           <a:prstGeom prst="straightConnector1">
             <a:avLst/>
@@ -3831,8 +3771,8 @@
         </p:nvCxnSpPr>
         <p:spPr>
           <a:xfrm>
-            <a:off x="5625548" y="2725768"/>
-            <a:ext cx="1359851" cy="0"/>
+            <a:off x="6428844" y="2722169"/>
+            <a:ext cx="2169508" cy="921"/>
           </a:xfrm>
           <a:prstGeom prst="straightConnector1">
             <a:avLst/>
@@ -3860,112 +3800,22 @@
           </a:fontRef>
         </p:style>
       </p:cxnSp>
-      <p:cxnSp>
-        <p:nvCxnSpPr>
-          <p:cNvPr id="28" name="Straight Arrow Connector 27">
-            <a:extLst>
-              <a:ext uri="{FF2B5EF4-FFF2-40B4-BE49-F238E27FC236}">
-                <a16:creationId xmlns:a16="http://schemas.microsoft.com/office/drawing/2014/main" id="{463033C6-0F6E-601D-D050-5B408029A84F}"/>
-              </a:ext>
-            </a:extLst>
-          </p:cNvPr>
-          <p:cNvCxnSpPr>
-            <a:cxnSpLocks/>
-          </p:cNvCxnSpPr>
+      <p:sp>
+        <p:nvSpPr>
+          <p:cNvPr id="35" name="Rectangle 34">
+            <a:extLst>
+              <a:ext uri="{FF2B5EF4-FFF2-40B4-BE49-F238E27FC236}">
+                <a16:creationId xmlns:a16="http://schemas.microsoft.com/office/drawing/2014/main" id="{DAF4BC9B-95D2-07DD-A2EE-C8EBF121D7FB}"/>
+              </a:ext>
+            </a:extLst>
+          </p:cNvPr>
+          <p:cNvSpPr/>
           <p:nvPr/>
-        </p:nvCxnSpPr>
+        </p:nvSpPr>
         <p:spPr>
           <a:xfrm>
-            <a:off x="7615101" y="2723090"/>
-            <a:ext cx="1051508" cy="0"/>
-          </a:xfrm>
-          <a:prstGeom prst="straightConnector1">
-            <a:avLst/>
-          </a:prstGeom>
-          <a:ln w="12700">
-            <a:solidFill>
-              <a:schemeClr val="tx2"/>
-            </a:solidFill>
-            <a:headEnd type="arrow" w="med" len="sm"/>
-            <a:tailEnd type="arrow" w="med" len="sm"/>
-          </a:ln>
-        </p:spPr>
-        <p:style>
-          <a:lnRef idx="1">
-            <a:schemeClr val="accent1"/>
-          </a:lnRef>
-          <a:fillRef idx="0">
-            <a:schemeClr val="accent1"/>
-          </a:fillRef>
-          <a:effectRef idx="0">
-            <a:schemeClr val="accent1"/>
-          </a:effectRef>
-          <a:fontRef idx="minor">
-            <a:schemeClr val="tx1"/>
-          </a:fontRef>
-        </p:style>
-      </p:cxnSp>
-      <p:cxnSp>
-        <p:nvCxnSpPr>
-          <p:cNvPr id="32" name="Straight Arrow Connector 31">
-            <a:extLst>
-              <a:ext uri="{FF2B5EF4-FFF2-40B4-BE49-F238E27FC236}">
-                <a16:creationId xmlns:a16="http://schemas.microsoft.com/office/drawing/2014/main" id="{EA8E5BC0-5608-4A21-F034-C08D8A599C1D}"/>
-              </a:ext>
-            </a:extLst>
-          </p:cNvPr>
-          <p:cNvCxnSpPr>
-            <a:cxnSpLocks/>
-          </p:cNvCxnSpPr>
-          <p:nvPr/>
-        </p:nvCxnSpPr>
-        <p:spPr>
-          <a:xfrm flipH="1" flipV="1">
-            <a:off x="9428609" y="2723090"/>
-            <a:ext cx="990482" cy="1364"/>
-          </a:xfrm>
-          <a:prstGeom prst="straightConnector1">
-            <a:avLst/>
-          </a:prstGeom>
-          <a:ln w="12700">
-            <a:solidFill>
-              <a:schemeClr val="tx2"/>
-            </a:solidFill>
-            <a:headEnd type="arrow" w="med" len="sm"/>
-            <a:tailEnd type="arrow" w="med" len="sm"/>
-          </a:ln>
-        </p:spPr>
-        <p:style>
-          <a:lnRef idx="1">
-            <a:schemeClr val="accent1"/>
-          </a:lnRef>
-          <a:fillRef idx="0">
-            <a:schemeClr val="accent1"/>
-          </a:fillRef>
-          <a:effectRef idx="0">
-            <a:schemeClr val="accent1"/>
-          </a:effectRef>
-          <a:fontRef idx="minor">
-            <a:schemeClr val="tx1"/>
-          </a:fontRef>
-        </p:style>
-      </p:cxnSp>
-      <p:sp>
-        <p:nvSpPr>
-          <p:cNvPr id="35" name="Rectangle 34">
-            <a:extLst>
-              <a:ext uri="{FF2B5EF4-FFF2-40B4-BE49-F238E27FC236}">
-                <a16:creationId xmlns:a16="http://schemas.microsoft.com/office/drawing/2014/main" id="{DAF4BC9B-95D2-07DD-A2EE-C8EBF121D7FB}"/>
-              </a:ext>
-            </a:extLst>
-          </p:cNvPr>
-          <p:cNvSpPr/>
-          <p:nvPr/>
-        </p:nvSpPr>
-        <p:spPr>
-          <a:xfrm>
-            <a:off x="4547136" y="1405253"/>
-            <a:ext cx="7340064" cy="4209735"/>
+            <a:off x="4292952" y="892099"/>
+            <a:ext cx="6379968" cy="4722890"/>
           </a:xfrm>
           <a:prstGeom prst="rect">
             <a:avLst/>
@@ -4031,10 +3881,10 @@
           <p:nvPr/>
         </p:nvPicPr>
         <p:blipFill>
-          <a:blip r:embed="rId6">
+          <a:blip r:embed="rId5">
             <a:extLst>
               <a:ext uri="{96DAC541-7B7A-43D3-8B79-37D633B846F1}">
-                <asvg:svgBlip xmlns:asvg="http://schemas.microsoft.com/office/drawing/2016/SVG/main" r:embed="rId7"/>
+                <asvg:svgBlip xmlns:asvg="http://schemas.microsoft.com/office/drawing/2016/SVG/main" r:embed="rId6"/>
               </a:ext>
             </a:extLst>
           </a:blip>
@@ -4043,7 +3893,7 @@
         </p:blipFill>
         <p:spPr>
           <a:xfrm>
-            <a:off x="4547136" y="1405253"/>
+            <a:off x="4291320" y="894845"/>
             <a:ext cx="381000" cy="381000"/>
           </a:xfrm>
           <a:prstGeom prst="rect">
@@ -4051,141 +3901,6 @@
           </a:prstGeom>
         </p:spPr>
       </p:pic>
-      <p:cxnSp>
-        <p:nvCxnSpPr>
-          <p:cNvPr id="40" name="Straight Arrow Connector 39">
-            <a:extLst>
-              <a:ext uri="{FF2B5EF4-FFF2-40B4-BE49-F238E27FC236}">
-                <a16:creationId xmlns:a16="http://schemas.microsoft.com/office/drawing/2014/main" id="{EFA335E5-A6A3-AD3D-F98A-3FCBEF56BFE7}"/>
-              </a:ext>
-            </a:extLst>
-          </p:cNvPr>
-          <p:cNvCxnSpPr>
-            <a:cxnSpLocks/>
-          </p:cNvCxnSpPr>
-          <p:nvPr/>
-        </p:nvCxnSpPr>
-        <p:spPr>
-          <a:xfrm flipV="1">
-            <a:off x="7952130" y="2723090"/>
-            <a:ext cx="0" cy="2144172"/>
-          </a:xfrm>
-          <a:prstGeom prst="straightConnector1">
-            <a:avLst/>
-          </a:prstGeom>
-          <a:ln w="12700">
-            <a:solidFill>
-              <a:schemeClr val="tx2"/>
-            </a:solidFill>
-            <a:headEnd type="none" w="med" len="sm"/>
-            <a:tailEnd type="none" w="med" len="sm"/>
-          </a:ln>
-        </p:spPr>
-        <p:style>
-          <a:lnRef idx="1">
-            <a:schemeClr val="accent1"/>
-          </a:lnRef>
-          <a:fillRef idx="0">
-            <a:schemeClr val="accent1"/>
-          </a:fillRef>
-          <a:effectRef idx="0">
-            <a:schemeClr val="accent1"/>
-          </a:effectRef>
-          <a:fontRef idx="minor">
-            <a:schemeClr val="tx1"/>
-          </a:fontRef>
-        </p:style>
-      </p:cxnSp>
-      <p:cxnSp>
-        <p:nvCxnSpPr>
-          <p:cNvPr id="46" name="Straight Arrow Connector 45">
-            <a:extLst>
-              <a:ext uri="{FF2B5EF4-FFF2-40B4-BE49-F238E27FC236}">
-                <a16:creationId xmlns:a16="http://schemas.microsoft.com/office/drawing/2014/main" id="{1B844084-AB31-590F-7358-24E678620B59}"/>
-              </a:ext>
-            </a:extLst>
-          </p:cNvPr>
-          <p:cNvCxnSpPr>
-            <a:cxnSpLocks/>
-          </p:cNvCxnSpPr>
-          <p:nvPr/>
-        </p:nvCxnSpPr>
-        <p:spPr>
-          <a:xfrm flipV="1">
-            <a:off x="11713563" y="2723090"/>
-            <a:ext cx="0" cy="2130944"/>
-          </a:xfrm>
-          <a:prstGeom prst="straightConnector1">
-            <a:avLst/>
-          </a:prstGeom>
-          <a:ln w="12700">
-            <a:solidFill>
-              <a:schemeClr val="tx2"/>
-            </a:solidFill>
-            <a:headEnd type="none" w="med" len="sm"/>
-            <a:tailEnd type="none" w="med" len="sm"/>
-          </a:ln>
-        </p:spPr>
-        <p:style>
-          <a:lnRef idx="1">
-            <a:schemeClr val="accent1"/>
-          </a:lnRef>
-          <a:fillRef idx="0">
-            <a:schemeClr val="accent1"/>
-          </a:fillRef>
-          <a:effectRef idx="0">
-            <a:schemeClr val="accent1"/>
-          </a:effectRef>
-          <a:fontRef idx="minor">
-            <a:schemeClr val="tx1"/>
-          </a:fontRef>
-        </p:style>
-      </p:cxnSp>
-      <p:cxnSp>
-        <p:nvCxnSpPr>
-          <p:cNvPr id="49" name="Straight Arrow Connector 48">
-            <a:extLst>
-              <a:ext uri="{FF2B5EF4-FFF2-40B4-BE49-F238E27FC236}">
-                <a16:creationId xmlns:a16="http://schemas.microsoft.com/office/drawing/2014/main" id="{58844BA4-F423-0042-1758-697CB00170ED}"/>
-              </a:ext>
-            </a:extLst>
-          </p:cNvPr>
-          <p:cNvCxnSpPr>
-            <a:cxnSpLocks/>
-          </p:cNvCxnSpPr>
-          <p:nvPr/>
-        </p:nvCxnSpPr>
-        <p:spPr>
-          <a:xfrm>
-            <a:off x="10451055" y="4854034"/>
-            <a:ext cx="1262508" cy="0"/>
-          </a:xfrm>
-          <a:prstGeom prst="straightConnector1">
-            <a:avLst/>
-          </a:prstGeom>
-          <a:ln w="12700">
-            <a:solidFill>
-              <a:schemeClr val="tx2"/>
-            </a:solidFill>
-            <a:headEnd type="arrow" w="med" len="sm"/>
-            <a:tailEnd type="none" w="med" len="sm"/>
-          </a:ln>
-        </p:spPr>
-        <p:style>
-          <a:lnRef idx="1">
-            <a:schemeClr val="accent1"/>
-          </a:lnRef>
-          <a:fillRef idx="0">
-            <a:schemeClr val="accent1"/>
-          </a:fillRef>
-          <a:effectRef idx="0">
-            <a:schemeClr val="accent1"/>
-          </a:effectRef>
-          <a:fontRef idx="minor">
-            <a:schemeClr val="tx1"/>
-          </a:fontRef>
-        </p:style>
-      </p:cxnSp>
       <p:pic>
         <p:nvPicPr>
           <p:cNvPr id="59" name="Graphic 58">
@@ -4201,10 +3916,10 @@
           <p:nvPr/>
         </p:nvPicPr>
         <p:blipFill>
-          <a:blip r:embed="rId8">
+          <a:blip r:embed="rId7">
             <a:extLst>
               <a:ext uri="{96DAC541-7B7A-43D3-8B79-37D633B846F1}">
-                <asvg:svgBlip xmlns:asvg="http://schemas.microsoft.com/office/drawing/2016/SVG/main" r:embed="rId9"/>
+                <asvg:svgBlip xmlns:asvg="http://schemas.microsoft.com/office/drawing/2016/SVG/main" r:embed="rId8"/>
               </a:ext>
             </a:extLst>
           </a:blip>
@@ -4214,7 +3929,7 @@
         </p:blipFill>
         <p:spPr>
           <a:xfrm>
-            <a:off x="325702" y="1446677"/>
+            <a:off x="336853" y="933723"/>
             <a:ext cx="384048" cy="268731"/>
           </a:xfrm>
           <a:prstGeom prst="rect">
@@ -4310,7 +4025,7 @@
         </p:nvSpPr>
         <p:spPr bwMode="auto">
           <a:xfrm>
-            <a:off x="4010931" y="3101513"/>
+            <a:off x="4834758" y="3115044"/>
             <a:ext cx="2279650" cy="276999"/>
           </a:xfrm>
           <a:prstGeom prst="rect">
@@ -4471,7 +4186,7 @@
         </p:nvSpPr>
         <p:spPr bwMode="auto">
           <a:xfrm>
-            <a:off x="6175630" y="3101513"/>
+            <a:off x="7789956" y="2918876"/>
             <a:ext cx="2292350" cy="276999"/>
           </a:xfrm>
           <a:prstGeom prst="rect">
@@ -4611,7 +4326,7 @@
                 <a:ea typeface="Amazon Ember" panose="020B0603020204020204" pitchFamily="34" charset="0"/>
                 <a:cs typeface="Arial" panose="020B0604020202020204" pitchFamily="34" charset="0"/>
               </a:rPr>
-              <a:t>Lambda function</a:t>
+              <a:t>AWS Lambda function</a:t>
             </a:r>
           </a:p>
         </p:txBody>
@@ -4632,7 +4347,168 @@
         </p:nvSpPr>
         <p:spPr bwMode="auto">
           <a:xfrm>
-            <a:off x="7926393" y="3106618"/>
+            <a:off x="4333448" y="3907297"/>
+            <a:ext cx="3054517" cy="276999"/>
+          </a:xfrm>
+          <a:prstGeom prst="rect">
+            <a:avLst/>
+          </a:prstGeom>
+          <a:noFill/>
+          <a:ln>
+            <a:noFill/>
+          </a:ln>
+          <a:extLst>
+            <a:ext uri="{909E8E84-426E-40DD-AFC4-6F175D3DCCD1}">
+              <a14:hiddenFill xmlns:a14="http://schemas.microsoft.com/office/drawing/2010/main">
+                <a:solidFill>
+                  <a:srgbClr val="FFFFFF"/>
+                </a:solidFill>
+              </a14:hiddenFill>
+            </a:ext>
+            <a:ext uri="{91240B29-F687-4F45-9708-019B960494DF}">
+              <a14:hiddenLine xmlns:a14="http://schemas.microsoft.com/office/drawing/2010/main" w="9525">
+                <a:solidFill>
+                  <a:srgbClr val="000000"/>
+                </a:solidFill>
+                <a:miter lim="800000"/>
+                <a:headEnd/>
+                <a:tailEnd/>
+              </a14:hiddenLine>
+            </a:ext>
+          </a:extLst>
+        </p:spPr>
+        <p:txBody>
+          <a:bodyPr wrap="square">
+            <a:spAutoFit/>
+          </a:bodyPr>
+          <a:lstStyle>
+            <a:lvl1pPr>
+              <a:defRPr>
+                <a:solidFill>
+                  <a:schemeClr val="tx1"/>
+                </a:solidFill>
+                <a:latin typeface="Calibri" panose="020F0502020204030204" pitchFamily="34" charset="0"/>
+              </a:defRPr>
+            </a:lvl1pPr>
+            <a:lvl2pPr marL="742950" indent="-285750">
+              <a:defRPr>
+                <a:solidFill>
+                  <a:schemeClr val="tx1"/>
+                </a:solidFill>
+                <a:latin typeface="Calibri" panose="020F0502020204030204" pitchFamily="34" charset="0"/>
+              </a:defRPr>
+            </a:lvl2pPr>
+            <a:lvl3pPr marL="1143000" indent="-228600">
+              <a:defRPr>
+                <a:solidFill>
+                  <a:schemeClr val="tx1"/>
+                </a:solidFill>
+                <a:latin typeface="Calibri" panose="020F0502020204030204" pitchFamily="34" charset="0"/>
+              </a:defRPr>
+            </a:lvl3pPr>
+            <a:lvl4pPr marL="1600200" indent="-228600">
+              <a:defRPr>
+                <a:solidFill>
+                  <a:schemeClr val="tx1"/>
+                </a:solidFill>
+                <a:latin typeface="Calibri" panose="020F0502020204030204" pitchFamily="34" charset="0"/>
+              </a:defRPr>
+            </a:lvl4pPr>
+            <a:lvl5pPr marL="2057400" indent="-228600">
+              <a:defRPr>
+                <a:solidFill>
+                  <a:schemeClr val="tx1"/>
+                </a:solidFill>
+                <a:latin typeface="Calibri" panose="020F0502020204030204" pitchFamily="34" charset="0"/>
+              </a:defRPr>
+            </a:lvl5pPr>
+            <a:lvl6pPr marL="2514600" indent="-228600" eaLnBrk="0" fontAlgn="base" hangingPunct="0">
+              <a:spcBef>
+                <a:spcPct val="0"/>
+              </a:spcBef>
+              <a:spcAft>
+                <a:spcPct val="0"/>
+              </a:spcAft>
+              <a:defRPr>
+                <a:solidFill>
+                  <a:schemeClr val="tx1"/>
+                </a:solidFill>
+                <a:latin typeface="Calibri" panose="020F0502020204030204" pitchFamily="34" charset="0"/>
+              </a:defRPr>
+            </a:lvl6pPr>
+            <a:lvl7pPr marL="2971800" indent="-228600" eaLnBrk="0" fontAlgn="base" hangingPunct="0">
+              <a:spcBef>
+                <a:spcPct val="0"/>
+              </a:spcBef>
+              <a:spcAft>
+                <a:spcPct val="0"/>
+              </a:spcAft>
+              <a:defRPr>
+                <a:solidFill>
+                  <a:schemeClr val="tx1"/>
+                </a:solidFill>
+                <a:latin typeface="Calibri" panose="020F0502020204030204" pitchFamily="34" charset="0"/>
+              </a:defRPr>
+            </a:lvl7pPr>
+            <a:lvl8pPr marL="3429000" indent="-228600" eaLnBrk="0" fontAlgn="base" hangingPunct="0">
+              <a:spcBef>
+                <a:spcPct val="0"/>
+              </a:spcBef>
+              <a:spcAft>
+                <a:spcPct val="0"/>
+              </a:spcAft>
+              <a:defRPr>
+                <a:solidFill>
+                  <a:schemeClr val="tx1"/>
+                </a:solidFill>
+                <a:latin typeface="Calibri" panose="020F0502020204030204" pitchFamily="34" charset="0"/>
+              </a:defRPr>
+            </a:lvl8pPr>
+            <a:lvl9pPr marL="3886200" indent="-228600" eaLnBrk="0" fontAlgn="base" hangingPunct="0">
+              <a:spcBef>
+                <a:spcPct val="0"/>
+              </a:spcBef>
+              <a:spcAft>
+                <a:spcPct val="0"/>
+              </a:spcAft>
+              <a:defRPr>
+                <a:solidFill>
+                  <a:schemeClr val="tx1"/>
+                </a:solidFill>
+                <a:latin typeface="Calibri" panose="020F0502020204030204" pitchFamily="34" charset="0"/>
+              </a:defRPr>
+            </a:lvl9pPr>
+          </a:lstStyle>
+          <a:p>
+            <a:pPr algn="ctr" eaLnBrk="1" hangingPunct="1"/>
+            <a:r>
+              <a:rPr lang="en-US" altLang="en-US" sz="1200" dirty="0">
+                <a:latin typeface="Arial" panose="020B0604020202020204" pitchFamily="34" charset="0"/>
+                <a:ea typeface="Amazon Ember" panose="020B0603020204020204" pitchFamily="34" charset="0"/>
+                <a:cs typeface="Arial" panose="020B0604020202020204" pitchFamily="34" charset="0"/>
+              </a:rPr>
+              <a:t>AWS Systems Manager Parameter Store</a:t>
+            </a:r>
+          </a:p>
+        </p:txBody>
+      </p:sp>
+      <p:sp>
+        <p:nvSpPr>
+          <p:cNvPr id="70" name="TextBox 11">
+            <a:extLst>
+              <a:ext uri="{FF2B5EF4-FFF2-40B4-BE49-F238E27FC236}">
+                <a16:creationId xmlns:a16="http://schemas.microsoft.com/office/drawing/2014/main" id="{7C86428C-FC7C-9A83-D8C8-40FD42A2C6B8}"/>
+              </a:ext>
+            </a:extLst>
+          </p:cNvPr>
+          <p:cNvSpPr txBox="1">
+            <a:spLocks noChangeArrowheads="1"/>
+          </p:cNvSpPr>
+          <p:nvPr/>
+        </p:nvSpPr>
+        <p:spPr bwMode="auto">
+          <a:xfrm>
+            <a:off x="4828408" y="5119919"/>
             <a:ext cx="2292350" cy="276999"/>
           </a:xfrm>
           <a:prstGeom prst="rect">
@@ -4772,62 +4648,17 @@
                 <a:ea typeface="Amazon Ember" panose="020B0603020204020204" pitchFamily="34" charset="0"/>
                 <a:cs typeface="Arial" panose="020B0604020202020204" pitchFamily="34" charset="0"/>
               </a:rPr>
-              <a:t>Parameter Store</a:t>
-            </a:r>
-          </a:p>
-        </p:txBody>
-      </p:sp>
-      <p:cxnSp>
-        <p:nvCxnSpPr>
-          <p:cNvPr id="65" name="Straight Arrow Connector 64">
-            <a:extLst>
-              <a:ext uri="{FF2B5EF4-FFF2-40B4-BE49-F238E27FC236}">
-                <a16:creationId xmlns:a16="http://schemas.microsoft.com/office/drawing/2014/main" id="{64CCBA96-E02B-FF31-16C5-55EFBC456131}"/>
-              </a:ext>
-            </a:extLst>
-          </p:cNvPr>
-          <p:cNvCxnSpPr>
-            <a:cxnSpLocks/>
-          </p:cNvCxnSpPr>
-          <p:nvPr/>
-        </p:nvCxnSpPr>
-        <p:spPr>
-          <a:xfrm flipV="1">
-            <a:off x="11360426" y="2723090"/>
-            <a:ext cx="353137" cy="1364"/>
-          </a:xfrm>
-          <a:prstGeom prst="straightConnector1">
-            <a:avLst/>
-          </a:prstGeom>
-          <a:ln w="12700">
-            <a:solidFill>
-              <a:schemeClr val="tx2"/>
-            </a:solidFill>
-            <a:headEnd type="none" w="med" len="sm"/>
-            <a:tailEnd type="none" w="med" len="sm"/>
-          </a:ln>
-        </p:spPr>
-        <p:style>
-          <a:lnRef idx="1">
-            <a:schemeClr val="accent1"/>
-          </a:lnRef>
-          <a:fillRef idx="0">
-            <a:schemeClr val="accent1"/>
-          </a:fillRef>
-          <a:effectRef idx="0">
-            <a:schemeClr val="accent1"/>
-          </a:effectRef>
-          <a:fontRef idx="minor">
-            <a:schemeClr val="tx1"/>
-          </a:fontRef>
-        </p:style>
-      </p:cxnSp>
-      <p:sp>
-        <p:nvSpPr>
-          <p:cNvPr id="70" name="TextBox 11">
-            <a:extLst>
-              <a:ext uri="{FF2B5EF4-FFF2-40B4-BE49-F238E27FC236}">
-                <a16:creationId xmlns:a16="http://schemas.microsoft.com/office/drawing/2014/main" id="{7C86428C-FC7C-9A83-D8C8-40FD42A2C6B8}"/>
+              <a:t>AWS Secrets Manager</a:t>
+            </a:r>
+          </a:p>
+        </p:txBody>
+      </p:sp>
+      <p:sp>
+        <p:nvSpPr>
+          <p:cNvPr id="73" name="TextBox 9">
+            <a:extLst>
+              <a:ext uri="{FF2B5EF4-FFF2-40B4-BE49-F238E27FC236}">
+                <a16:creationId xmlns:a16="http://schemas.microsoft.com/office/drawing/2014/main" id="{CBF15F8D-7AB9-F518-4A02-0C2A54686F40}"/>
               </a:ext>
             </a:extLst>
           </p:cNvPr>
@@ -4838,168 +4669,7 @@
         </p:nvSpPr>
         <p:spPr bwMode="auto">
           <a:xfrm>
-            <a:off x="9736438" y="3104090"/>
-            <a:ext cx="2292350" cy="276999"/>
-          </a:xfrm>
-          <a:prstGeom prst="rect">
-            <a:avLst/>
-          </a:prstGeom>
-          <a:noFill/>
-          <a:ln>
-            <a:noFill/>
-          </a:ln>
-          <a:extLst>
-            <a:ext uri="{909E8E84-426E-40DD-AFC4-6F175D3DCCD1}">
-              <a14:hiddenFill xmlns:a14="http://schemas.microsoft.com/office/drawing/2010/main">
-                <a:solidFill>
-                  <a:srgbClr val="FFFFFF"/>
-                </a:solidFill>
-              </a14:hiddenFill>
-            </a:ext>
-            <a:ext uri="{91240B29-F687-4F45-9708-019B960494DF}">
-              <a14:hiddenLine xmlns:a14="http://schemas.microsoft.com/office/drawing/2010/main" w="9525">
-                <a:solidFill>
-                  <a:srgbClr val="000000"/>
-                </a:solidFill>
-                <a:miter lim="800000"/>
-                <a:headEnd/>
-                <a:tailEnd/>
-              </a14:hiddenLine>
-            </a:ext>
-          </a:extLst>
-        </p:spPr>
-        <p:txBody>
-          <a:bodyPr>
-            <a:spAutoFit/>
-          </a:bodyPr>
-          <a:lstStyle>
-            <a:lvl1pPr>
-              <a:defRPr>
-                <a:solidFill>
-                  <a:schemeClr val="tx1"/>
-                </a:solidFill>
-                <a:latin typeface="Calibri" panose="020F0502020204030204" pitchFamily="34" charset="0"/>
-              </a:defRPr>
-            </a:lvl1pPr>
-            <a:lvl2pPr marL="742950" indent="-285750">
-              <a:defRPr>
-                <a:solidFill>
-                  <a:schemeClr val="tx1"/>
-                </a:solidFill>
-                <a:latin typeface="Calibri" panose="020F0502020204030204" pitchFamily="34" charset="0"/>
-              </a:defRPr>
-            </a:lvl2pPr>
-            <a:lvl3pPr marL="1143000" indent="-228600">
-              <a:defRPr>
-                <a:solidFill>
-                  <a:schemeClr val="tx1"/>
-                </a:solidFill>
-                <a:latin typeface="Calibri" panose="020F0502020204030204" pitchFamily="34" charset="0"/>
-              </a:defRPr>
-            </a:lvl3pPr>
-            <a:lvl4pPr marL="1600200" indent="-228600">
-              <a:defRPr>
-                <a:solidFill>
-                  <a:schemeClr val="tx1"/>
-                </a:solidFill>
-                <a:latin typeface="Calibri" panose="020F0502020204030204" pitchFamily="34" charset="0"/>
-              </a:defRPr>
-            </a:lvl4pPr>
-            <a:lvl5pPr marL="2057400" indent="-228600">
-              <a:defRPr>
-                <a:solidFill>
-                  <a:schemeClr val="tx1"/>
-                </a:solidFill>
-                <a:latin typeface="Calibri" panose="020F0502020204030204" pitchFamily="34" charset="0"/>
-              </a:defRPr>
-            </a:lvl5pPr>
-            <a:lvl6pPr marL="2514600" indent="-228600" eaLnBrk="0" fontAlgn="base" hangingPunct="0">
-              <a:spcBef>
-                <a:spcPct val="0"/>
-              </a:spcBef>
-              <a:spcAft>
-                <a:spcPct val="0"/>
-              </a:spcAft>
-              <a:defRPr>
-                <a:solidFill>
-                  <a:schemeClr val="tx1"/>
-                </a:solidFill>
-                <a:latin typeface="Calibri" panose="020F0502020204030204" pitchFamily="34" charset="0"/>
-              </a:defRPr>
-            </a:lvl6pPr>
-            <a:lvl7pPr marL="2971800" indent="-228600" eaLnBrk="0" fontAlgn="base" hangingPunct="0">
-              <a:spcBef>
-                <a:spcPct val="0"/>
-              </a:spcBef>
-              <a:spcAft>
-                <a:spcPct val="0"/>
-              </a:spcAft>
-              <a:defRPr>
-                <a:solidFill>
-                  <a:schemeClr val="tx1"/>
-                </a:solidFill>
-                <a:latin typeface="Calibri" panose="020F0502020204030204" pitchFamily="34" charset="0"/>
-              </a:defRPr>
-            </a:lvl7pPr>
-            <a:lvl8pPr marL="3429000" indent="-228600" eaLnBrk="0" fontAlgn="base" hangingPunct="0">
-              <a:spcBef>
-                <a:spcPct val="0"/>
-              </a:spcBef>
-              <a:spcAft>
-                <a:spcPct val="0"/>
-              </a:spcAft>
-              <a:defRPr>
-                <a:solidFill>
-                  <a:schemeClr val="tx1"/>
-                </a:solidFill>
-                <a:latin typeface="Calibri" panose="020F0502020204030204" pitchFamily="34" charset="0"/>
-              </a:defRPr>
-            </a:lvl8pPr>
-            <a:lvl9pPr marL="3886200" indent="-228600" eaLnBrk="0" fontAlgn="base" hangingPunct="0">
-              <a:spcBef>
-                <a:spcPct val="0"/>
-              </a:spcBef>
-              <a:spcAft>
-                <a:spcPct val="0"/>
-              </a:spcAft>
-              <a:defRPr>
-                <a:solidFill>
-                  <a:schemeClr val="tx1"/>
-                </a:solidFill>
-                <a:latin typeface="Calibri" panose="020F0502020204030204" pitchFamily="34" charset="0"/>
-              </a:defRPr>
-            </a:lvl9pPr>
-          </a:lstStyle>
-          <a:p>
-            <a:pPr algn="ctr" eaLnBrk="1" hangingPunct="1"/>
-            <a:r>
-              <a:rPr lang="en-US" altLang="en-US" sz="1200" dirty="0">
-                <a:latin typeface="Arial" panose="020B0604020202020204" pitchFamily="34" charset="0"/>
-                <a:ea typeface="Amazon Ember" panose="020B0603020204020204" pitchFamily="34" charset="0"/>
-                <a:cs typeface="Arial" panose="020B0604020202020204" pitchFamily="34" charset="0"/>
-              </a:rPr>
-              <a:t>AWS Secrets Manager</a:t>
-            </a:r>
-          </a:p>
-        </p:txBody>
-      </p:sp>
-      <p:sp>
-        <p:nvSpPr>
-          <p:cNvPr id="73" name="TextBox 9">
-            <a:extLst>
-              <a:ext uri="{FF2B5EF4-FFF2-40B4-BE49-F238E27FC236}">
-                <a16:creationId xmlns:a16="http://schemas.microsoft.com/office/drawing/2014/main" id="{CBF15F8D-7AB9-F518-4A02-0C2A54686F40}"/>
-              </a:ext>
-            </a:extLst>
-          </p:cNvPr>
-          <p:cNvSpPr txBox="1">
-            <a:spLocks noChangeArrowheads="1"/>
-          </p:cNvSpPr>
-          <p:nvPr/>
-        </p:nvSpPr>
-        <p:spPr bwMode="auto">
-          <a:xfrm>
-            <a:off x="8532907" y="5228522"/>
+            <a:off x="7362486" y="5079946"/>
             <a:ext cx="3010367" cy="276999"/>
           </a:xfrm>
           <a:prstGeom prst="rect">
@@ -5158,8 +4828,8 @@
         </p:nvSpPr>
         <p:spPr>
           <a:xfrm>
-            <a:off x="3298595" y="2278150"/>
-            <a:ext cx="1362721" cy="430887"/>
+            <a:off x="3351743" y="2444376"/>
+            <a:ext cx="2090030" cy="261610"/>
           </a:xfrm>
           <a:prstGeom prst="rect">
             <a:avLst/>
@@ -5197,7 +4867,7 @@
         </p:nvSpPr>
         <p:spPr>
           <a:xfrm>
-            <a:off x="5409276" y="2433337"/>
+            <a:off x="6499569" y="2447427"/>
             <a:ext cx="1637020" cy="261610"/>
           </a:xfrm>
           <a:prstGeom prst="rect">
@@ -5222,162 +4892,6 @@
           </a:p>
         </p:txBody>
       </p:sp>
-      <p:sp>
-        <p:nvSpPr>
-          <p:cNvPr id="90" name="TextBox 89">
-            <a:extLst>
-              <a:ext uri="{FF2B5EF4-FFF2-40B4-BE49-F238E27FC236}">
-                <a16:creationId xmlns:a16="http://schemas.microsoft.com/office/drawing/2014/main" id="{99E9F77A-9C09-54EC-8F26-619DF3DA168A}"/>
-              </a:ext>
-            </a:extLst>
-          </p:cNvPr>
-          <p:cNvSpPr txBox="1"/>
-          <p:nvPr/>
-        </p:nvSpPr>
-        <p:spPr>
-          <a:xfrm>
-            <a:off x="7615102" y="2447427"/>
-            <a:ext cx="1204132" cy="261610"/>
-          </a:xfrm>
-          <a:prstGeom prst="rect">
-            <a:avLst/>
-          </a:prstGeom>
-          <a:noFill/>
-        </p:spPr>
-        <p:txBody>
-          <a:bodyPr wrap="square" rtlCol="0">
-            <a:spAutoFit/>
-          </a:bodyPr>
-          <a:lstStyle/>
-          <a:p>
-            <a:pPr algn="ctr"/>
-            <a:r>
-              <a:rPr lang="en-US" sz="1100" i="1" dirty="0">
-                <a:latin typeface="Arial" panose="020B0604020202020204" pitchFamily="34" charset="0"/>
-                <a:cs typeface="Arial" panose="020B0604020202020204" pitchFamily="34" charset="0"/>
-              </a:rPr>
-              <a:t>refers to</a:t>
-            </a:r>
-          </a:p>
-        </p:txBody>
-      </p:sp>
-      <p:sp>
-        <p:nvSpPr>
-          <p:cNvPr id="91" name="TextBox 90">
-            <a:extLst>
-              <a:ext uri="{FF2B5EF4-FFF2-40B4-BE49-F238E27FC236}">
-                <a16:creationId xmlns:a16="http://schemas.microsoft.com/office/drawing/2014/main" id="{D8F82628-F313-95FD-8CE2-C1D612A1C00A}"/>
-              </a:ext>
-            </a:extLst>
-          </p:cNvPr>
-          <p:cNvSpPr txBox="1"/>
-          <p:nvPr/>
-        </p:nvSpPr>
-        <p:spPr>
-          <a:xfrm>
-            <a:off x="9341835" y="2433043"/>
-            <a:ext cx="1109220" cy="261610"/>
-          </a:xfrm>
-          <a:prstGeom prst="rect">
-            <a:avLst/>
-          </a:prstGeom>
-          <a:noFill/>
-        </p:spPr>
-        <p:txBody>
-          <a:bodyPr wrap="square" rtlCol="0">
-            <a:spAutoFit/>
-          </a:bodyPr>
-          <a:lstStyle/>
-          <a:p>
-            <a:pPr algn="ctr"/>
-            <a:r>
-              <a:rPr lang="en-US" sz="1100" i="1" dirty="0">
-                <a:latin typeface="Arial" panose="020B0604020202020204" pitchFamily="34" charset="0"/>
-                <a:cs typeface="Arial" panose="020B0604020202020204" pitchFamily="34" charset="0"/>
-              </a:rPr>
-              <a:t>refers to</a:t>
-            </a:r>
-          </a:p>
-        </p:txBody>
-      </p:sp>
-      <p:sp>
-        <p:nvSpPr>
-          <p:cNvPr id="94" name="TextBox 93">
-            <a:extLst>
-              <a:ext uri="{FF2B5EF4-FFF2-40B4-BE49-F238E27FC236}">
-                <a16:creationId xmlns:a16="http://schemas.microsoft.com/office/drawing/2014/main" id="{907F6773-7BE1-A889-1C45-99C55616F112}"/>
-              </a:ext>
-            </a:extLst>
-          </p:cNvPr>
-          <p:cNvSpPr txBox="1"/>
-          <p:nvPr/>
-        </p:nvSpPr>
-        <p:spPr>
-          <a:xfrm>
-            <a:off x="10229138" y="4549555"/>
-            <a:ext cx="1637020" cy="261610"/>
-          </a:xfrm>
-          <a:prstGeom prst="rect">
-            <a:avLst/>
-          </a:prstGeom>
-          <a:noFill/>
-        </p:spPr>
-        <p:txBody>
-          <a:bodyPr wrap="square" rtlCol="0">
-            <a:spAutoFit/>
-          </a:bodyPr>
-          <a:lstStyle/>
-          <a:p>
-            <a:pPr algn="ctr"/>
-            <a:r>
-              <a:rPr lang="en-US" sz="1100" i="1" dirty="0">
-                <a:latin typeface="Arial" panose="020B0604020202020204" pitchFamily="34" charset="0"/>
-                <a:cs typeface="Arial" panose="020B0604020202020204" pitchFamily="34" charset="0"/>
-              </a:rPr>
-              <a:t>accessed via</a:t>
-            </a:r>
-          </a:p>
-        </p:txBody>
-      </p:sp>
-      <p:sp>
-        <p:nvSpPr>
-          <p:cNvPr id="99" name="TextBox 98">
-            <a:extLst>
-              <a:ext uri="{FF2B5EF4-FFF2-40B4-BE49-F238E27FC236}">
-                <a16:creationId xmlns:a16="http://schemas.microsoft.com/office/drawing/2014/main" id="{01586629-14E8-BEF2-F21F-80234DD8CF4A}"/>
-              </a:ext>
-            </a:extLst>
-          </p:cNvPr>
-          <p:cNvSpPr txBox="1"/>
-          <p:nvPr/>
-        </p:nvSpPr>
-        <p:spPr>
-          <a:xfrm>
-            <a:off x="7889021" y="4560705"/>
-            <a:ext cx="1637020" cy="261610"/>
-          </a:xfrm>
-          <a:prstGeom prst="rect">
-            <a:avLst/>
-          </a:prstGeom>
-          <a:noFill/>
-        </p:spPr>
-        <p:txBody>
-          <a:bodyPr wrap="square" rtlCol="0">
-            <a:spAutoFit/>
-          </a:bodyPr>
-          <a:lstStyle/>
-          <a:p>
-            <a:pPr algn="ctr"/>
-            <a:r>
-              <a:rPr lang="en-US" sz="1100" i="1" dirty="0">
-                <a:latin typeface="Arial" panose="020B0604020202020204" pitchFamily="34" charset="0"/>
-                <a:cs typeface="Arial" panose="020B0604020202020204" pitchFamily="34" charset="0"/>
-              </a:rPr>
-              <a:t>sends SQL to</a:t>
-            </a:r>
-          </a:p>
-        </p:txBody>
-      </p:sp>
       <p:cxnSp>
         <p:nvCxnSpPr>
           <p:cNvPr id="107" name="Straight Arrow Connector 106">
@@ -5393,9 +4907,9 @@
           <p:nvPr/>
         </p:nvCxnSpPr>
         <p:spPr>
-          <a:xfrm flipH="1">
-            <a:off x="7952129" y="4867262"/>
-            <a:ext cx="1625455" cy="0"/>
+          <a:xfrm flipV="1">
+            <a:off x="8936131" y="3217463"/>
+            <a:ext cx="0" cy="956351"/>
           </a:xfrm>
           <a:prstGeom prst="straightConnector1">
             <a:avLst/>
@@ -5438,7 +4952,7 @@
           <p:nvPr/>
         </p:nvPicPr>
         <p:blipFill>
-          <a:blip r:embed="rId10">
+          <a:blip r:embed="rId9">
             <a:extLst>
               <a:ext uri="{28A0092B-C50C-407E-A947-70E740481C1C}">
                 <a14:useLocalDpi xmlns:a14="http://schemas.microsoft.com/office/drawing/2010/main" val="0"/>
@@ -5452,7 +4966,7 @@
         </p:blipFill>
         <p:spPr bwMode="auto">
           <a:xfrm>
-            <a:off x="7086545" y="2480437"/>
+            <a:off x="8707531" y="2480437"/>
             <a:ext cx="457200" cy="457200"/>
           </a:xfrm>
           <a:prstGeom prst="rect">
@@ -5483,12 +4997,117 @@
           </a:extLst>
         </p:spPr>
       </p:pic>
+      <p:sp>
+        <p:nvSpPr>
+          <p:cNvPr id="2" name="Rectangle 1">
+            <a:extLst>
+              <a:ext uri="{FF2B5EF4-FFF2-40B4-BE49-F238E27FC236}">
+                <a16:creationId xmlns:a16="http://schemas.microsoft.com/office/drawing/2014/main" id="{D03297B0-3059-01AE-D933-019CF7AD7F27}"/>
+              </a:ext>
+            </a:extLst>
+          </p:cNvPr>
+          <p:cNvSpPr/>
+          <p:nvPr/>
+        </p:nvSpPr>
+        <p:spPr bwMode="auto">
+          <a:xfrm>
+            <a:off x="7413445" y="1115135"/>
+            <a:ext cx="3054517" cy="4360107"/>
+          </a:xfrm>
+          <a:prstGeom prst="rect">
+            <a:avLst/>
+          </a:prstGeom>
+          <a:noFill/>
+          <a:ln w="12700">
+            <a:solidFill>
+              <a:srgbClr val="693BC5"/>
+            </a:solidFill>
+          </a:ln>
+        </p:spPr>
+        <p:style>
+          <a:lnRef idx="2">
+            <a:schemeClr val="accent1">
+              <a:shade val="50000"/>
+            </a:schemeClr>
+          </a:lnRef>
+          <a:fillRef idx="1">
+            <a:schemeClr val="accent1"/>
+          </a:fillRef>
+          <a:effectRef idx="0">
+            <a:schemeClr val="accent1"/>
+          </a:effectRef>
+          <a:fontRef idx="minor">
+            <a:schemeClr val="lt1"/>
+          </a:fontRef>
+        </p:style>
+        <p:txBody>
+          <a:bodyPr lIns="502920" tIns="91440"/>
+          <a:lstStyle/>
+          <a:p>
+            <a:pPr eaLnBrk="1" fontAlgn="auto" hangingPunct="1">
+              <a:spcBef>
+                <a:spcPts val="0"/>
+              </a:spcBef>
+              <a:spcAft>
+                <a:spcPts val="0"/>
+              </a:spcAft>
+              <a:defRPr/>
+            </a:pPr>
+            <a:r>
+              <a:rPr lang="en-US" sz="1200" dirty="0">
+                <a:ln w="0"/>
+                <a:solidFill>
+                  <a:srgbClr val="693BC5"/>
+                </a:solidFill>
+                <a:latin typeface="Arial" panose="020B0604020202020204" pitchFamily="34" charset="0"/>
+                <a:cs typeface="Arial" panose="020B0604020202020204" pitchFamily="34" charset="0"/>
+              </a:rPr>
+              <a:t>Virtual private cloud (VPC)</a:t>
+            </a:r>
+          </a:p>
+        </p:txBody>
+      </p:sp>
       <p:pic>
         <p:nvPicPr>
-          <p:cNvPr id="22" name="Graphic 26">
-            <a:extLst>
-              <a:ext uri="{FF2B5EF4-FFF2-40B4-BE49-F238E27FC236}">
-                <a16:creationId xmlns:a16="http://schemas.microsoft.com/office/drawing/2014/main" id="{DF168994-2E6A-93EB-C9DB-D1BE11B4EF54}"/>
+          <p:cNvPr id="6" name="Graphic 5">
+            <a:extLst>
+              <a:ext uri="{FF2B5EF4-FFF2-40B4-BE49-F238E27FC236}">
+                <a16:creationId xmlns:a16="http://schemas.microsoft.com/office/drawing/2014/main" id="{17F8111A-ADE2-8076-2706-A895242AC52B}"/>
+              </a:ext>
+            </a:extLst>
+          </p:cNvPr>
+          <p:cNvPicPr>
+            <a:picLocks noChangeAspect="1"/>
+          </p:cNvPicPr>
+          <p:nvPr/>
+        </p:nvPicPr>
+        <p:blipFill>
+          <a:blip r:embed="rId10">
+            <a:extLst>
+              <a:ext uri="{96DAC541-7B7A-43D3-8B79-37D633B846F1}">
+                <asvg:svgBlip xmlns:asvg="http://schemas.microsoft.com/office/drawing/2016/SVG/main" r:embed="rId11"/>
+              </a:ext>
+            </a:extLst>
+          </a:blip>
+          <a:srcRect/>
+          <a:stretch/>
+        </p:blipFill>
+        <p:spPr>
+          <a:xfrm>
+            <a:off x="7419528" y="1115135"/>
+            <a:ext cx="381000" cy="381000"/>
+          </a:xfrm>
+          <a:prstGeom prst="rect">
+            <a:avLst/>
+          </a:prstGeom>
+        </p:spPr>
+      </p:pic>
+      <p:pic>
+        <p:nvPicPr>
+          <p:cNvPr id="7" name="Graphic 26">
+            <a:extLst>
+              <a:ext uri="{FF2B5EF4-FFF2-40B4-BE49-F238E27FC236}">
+                <a16:creationId xmlns:a16="http://schemas.microsoft.com/office/drawing/2014/main" id="{5904E973-9BF8-425B-7EF4-8E4A74AA96D5}"/>
               </a:ext>
             </a:extLst>
           </p:cNvPr>
@@ -5498,7 +5117,7 @@
           <p:nvPr/>
         </p:nvPicPr>
         <p:blipFill>
-          <a:blip r:embed="rId11">
+          <a:blip r:embed="rId12">
             <a:extLst>
               <a:ext uri="{28A0092B-C50C-407E-A947-70E740481C1C}">
                 <a14:useLocalDpi xmlns:a14="http://schemas.microsoft.com/office/drawing/2010/main" val="0"/>
@@ -5512,7 +5131,7 @@
         </p:blipFill>
         <p:spPr bwMode="auto">
           <a:xfrm>
-            <a:off x="8843968" y="2466053"/>
+            <a:off x="5751691" y="3472327"/>
             <a:ext cx="457200" cy="457200"/>
           </a:xfrm>
           <a:prstGeom prst="rect">
@@ -5543,6 +5162,371 @@
           </a:extLst>
         </p:spPr>
       </p:pic>
+      <p:pic>
+        <p:nvPicPr>
+          <p:cNvPr id="10" name="Graphic 17">
+            <a:extLst>
+              <a:ext uri="{FF2B5EF4-FFF2-40B4-BE49-F238E27FC236}">
+                <a16:creationId xmlns:a16="http://schemas.microsoft.com/office/drawing/2014/main" id="{9D99812E-97AA-39E4-3562-DC9495094DC3}"/>
+              </a:ext>
+            </a:extLst>
+          </p:cNvPr>
+          <p:cNvPicPr>
+            <a:picLocks noChangeAspect="1" noChangeArrowheads="1"/>
+          </p:cNvPicPr>
+          <p:nvPr/>
+        </p:nvPicPr>
+        <p:blipFill>
+          <a:blip r:embed="rId13">
+            <a:extLst>
+              <a:ext uri="{28A0092B-C50C-407E-A947-70E740481C1C}">
+                <a14:useLocalDpi xmlns:a14="http://schemas.microsoft.com/office/drawing/2010/main" val="0"/>
+              </a:ext>
+            </a:extLst>
+          </a:blip>
+          <a:srcRect/>
+          <a:stretch>
+            <a:fillRect/>
+          </a:stretch>
+        </p:blipFill>
+        <p:spPr bwMode="auto">
+          <a:xfrm>
+            <a:off x="5597218" y="4357919"/>
+            <a:ext cx="762000" cy="762000"/>
+          </a:xfrm>
+          <a:prstGeom prst="rect">
+            <a:avLst/>
+          </a:prstGeom>
+          <a:noFill/>
+          <a:ln>
+            <a:noFill/>
+          </a:ln>
+          <a:extLst>
+            <a:ext uri="{909E8E84-426E-40DD-AFC4-6F175D3DCCD1}">
+              <a14:hiddenFill xmlns:a14="http://schemas.microsoft.com/office/drawing/2010/main">
+                <a:solidFill>
+                  <a:srgbClr val="FFFFFF"/>
+                </a:solidFill>
+              </a14:hiddenFill>
+            </a:ext>
+            <a:ext uri="{91240B29-F687-4F45-9708-019B960494DF}">
+              <a14:hiddenLine xmlns:a14="http://schemas.microsoft.com/office/drawing/2010/main" w="9525">
+                <a:solidFill>
+                  <a:srgbClr val="000000"/>
+                </a:solidFill>
+                <a:miter lim="800000"/>
+                <a:headEnd/>
+                <a:tailEnd/>
+              </a14:hiddenLine>
+            </a:ext>
+          </a:extLst>
+        </p:spPr>
+      </p:pic>
+      <p:cxnSp>
+        <p:nvCxnSpPr>
+          <p:cNvPr id="34" name="Straight Arrow Connector 33">
+            <a:extLst>
+              <a:ext uri="{FF2B5EF4-FFF2-40B4-BE49-F238E27FC236}">
+                <a16:creationId xmlns:a16="http://schemas.microsoft.com/office/drawing/2014/main" id="{22B81F96-C8D1-541F-7AB4-E8752C8959F5}"/>
+              </a:ext>
+            </a:extLst>
+          </p:cNvPr>
+          <p:cNvCxnSpPr>
+            <a:cxnSpLocks/>
+          </p:cNvCxnSpPr>
+          <p:nvPr/>
+        </p:nvCxnSpPr>
+        <p:spPr>
+          <a:xfrm flipH="1">
+            <a:off x="6475927" y="4689068"/>
+            <a:ext cx="1976697" cy="0"/>
+          </a:xfrm>
+          <a:prstGeom prst="straightConnector1">
+            <a:avLst/>
+          </a:prstGeom>
+          <a:ln w="12700">
+            <a:solidFill>
+              <a:schemeClr val="tx2"/>
+            </a:solidFill>
+            <a:headEnd type="arrow" w="med" len="sm"/>
+            <a:tailEnd type="none" w="med" len="sm"/>
+          </a:ln>
+        </p:spPr>
+        <p:style>
+          <a:lnRef idx="1">
+            <a:schemeClr val="accent1"/>
+          </a:lnRef>
+          <a:fillRef idx="0">
+            <a:schemeClr val="accent1"/>
+          </a:fillRef>
+          <a:effectRef idx="0">
+            <a:schemeClr val="accent1"/>
+          </a:effectRef>
+          <a:fontRef idx="minor">
+            <a:schemeClr val="tx1"/>
+          </a:fontRef>
+        </p:style>
+      </p:cxnSp>
+      <p:sp>
+        <p:nvSpPr>
+          <p:cNvPr id="41" name="TextBox 40">
+            <a:extLst>
+              <a:ext uri="{FF2B5EF4-FFF2-40B4-BE49-F238E27FC236}">
+                <a16:creationId xmlns:a16="http://schemas.microsoft.com/office/drawing/2014/main" id="{2B8F5D3D-206E-5729-5FEE-F8F9D3012105}"/>
+              </a:ext>
+            </a:extLst>
+          </p:cNvPr>
+          <p:cNvSpPr txBox="1"/>
+          <p:nvPr/>
+        </p:nvSpPr>
+        <p:spPr>
+          <a:xfrm>
+            <a:off x="6573205" y="4418516"/>
+            <a:ext cx="1637020" cy="261610"/>
+          </a:xfrm>
+          <a:prstGeom prst="rect">
+            <a:avLst/>
+          </a:prstGeom>
+          <a:noFill/>
+        </p:spPr>
+        <p:txBody>
+          <a:bodyPr wrap="square" rtlCol="0">
+            <a:spAutoFit/>
+          </a:bodyPr>
+          <a:lstStyle/>
+          <a:p>
+            <a:pPr algn="ctr"/>
+            <a:r>
+              <a:rPr lang="en-US" sz="1100" i="1" dirty="0">
+                <a:latin typeface="Arial" panose="020B0604020202020204" pitchFamily="34" charset="0"/>
+                <a:cs typeface="Arial" panose="020B0604020202020204" pitchFamily="34" charset="0"/>
+              </a:rPr>
+              <a:t>accessed via</a:t>
+            </a:r>
+          </a:p>
+        </p:txBody>
+      </p:sp>
+      <p:pic>
+        <p:nvPicPr>
+          <p:cNvPr id="42" name="Graphic 31">
+            <a:extLst>
+              <a:ext uri="{FF2B5EF4-FFF2-40B4-BE49-F238E27FC236}">
+                <a16:creationId xmlns:a16="http://schemas.microsoft.com/office/drawing/2014/main" id="{7307EB50-3859-59BC-B096-77ECB06D4B69}"/>
+              </a:ext>
+            </a:extLst>
+          </p:cNvPr>
+          <p:cNvPicPr>
+            <a:picLocks noChangeAspect="1" noChangeArrowheads="1"/>
+          </p:cNvPicPr>
+          <p:nvPr/>
+        </p:nvPicPr>
+        <p:blipFill>
+          <a:blip r:embed="rId14">
+            <a:extLst>
+              <a:ext uri="{28A0092B-C50C-407E-A947-70E740481C1C}">
+                <a14:useLocalDpi xmlns:a14="http://schemas.microsoft.com/office/drawing/2010/main" val="0"/>
+              </a:ext>
+            </a:extLst>
+          </a:blip>
+          <a:srcRect/>
+          <a:stretch>
+            <a:fillRect/>
+          </a:stretch>
+        </p:blipFill>
+        <p:spPr bwMode="auto">
+          <a:xfrm>
+            <a:off x="5751691" y="1281125"/>
+            <a:ext cx="457200" cy="457200"/>
+          </a:xfrm>
+          <a:prstGeom prst="rect">
+            <a:avLst/>
+          </a:prstGeom>
+          <a:noFill/>
+          <a:ln>
+            <a:noFill/>
+          </a:ln>
+          <a:extLst>
+            <a:ext uri="{909E8E84-426E-40DD-AFC4-6F175D3DCCD1}">
+              <a14:hiddenFill xmlns:a14="http://schemas.microsoft.com/office/drawing/2010/main">
+                <a:solidFill>
+                  <a:srgbClr val="FFFFFF"/>
+                </a:solidFill>
+              </a14:hiddenFill>
+            </a:ext>
+            <a:ext uri="{91240B29-F687-4F45-9708-019B960494DF}">
+              <a14:hiddenLine xmlns:a14="http://schemas.microsoft.com/office/drawing/2010/main" w="9525">
+                <a:solidFill>
+                  <a:srgbClr val="000000"/>
+                </a:solidFill>
+                <a:miter lim="800000"/>
+                <a:headEnd/>
+                <a:tailEnd/>
+              </a14:hiddenLine>
+            </a:ext>
+          </a:extLst>
+        </p:spPr>
+      </p:pic>
+      <p:sp>
+        <p:nvSpPr>
+          <p:cNvPr id="43" name="TextBox 15">
+            <a:extLst>
+              <a:ext uri="{FF2B5EF4-FFF2-40B4-BE49-F238E27FC236}">
+                <a16:creationId xmlns:a16="http://schemas.microsoft.com/office/drawing/2014/main" id="{E3671F9A-3DD2-091E-DFA1-F7D7B7E4D6FC}"/>
+              </a:ext>
+            </a:extLst>
+          </p:cNvPr>
+          <p:cNvSpPr txBox="1">
+            <a:spLocks noChangeArrowheads="1"/>
+          </p:cNvSpPr>
+          <p:nvPr/>
+        </p:nvSpPr>
+        <p:spPr bwMode="auto">
+          <a:xfrm>
+            <a:off x="4816256" y="1729142"/>
+            <a:ext cx="2279650" cy="276999"/>
+          </a:xfrm>
+          <a:prstGeom prst="rect">
+            <a:avLst/>
+          </a:prstGeom>
+          <a:noFill/>
+          <a:ln>
+            <a:noFill/>
+          </a:ln>
+          <a:extLst>
+            <a:ext uri="{909E8E84-426E-40DD-AFC4-6F175D3DCCD1}">
+              <a14:hiddenFill xmlns:a14="http://schemas.microsoft.com/office/drawing/2010/main">
+                <a:solidFill>
+                  <a:srgbClr val="FFFFFF"/>
+                </a:solidFill>
+              </a14:hiddenFill>
+            </a:ext>
+            <a:ext uri="{91240B29-F687-4F45-9708-019B960494DF}">
+              <a14:hiddenLine xmlns:a14="http://schemas.microsoft.com/office/drawing/2010/main" w="9525">
+                <a:solidFill>
+                  <a:srgbClr val="000000"/>
+                </a:solidFill>
+                <a:miter lim="800000"/>
+                <a:headEnd/>
+                <a:tailEnd/>
+              </a14:hiddenLine>
+            </a:ext>
+          </a:extLst>
+        </p:spPr>
+        <p:txBody>
+          <a:bodyPr>
+            <a:spAutoFit/>
+          </a:bodyPr>
+          <a:lstStyle>
+            <a:lvl1pPr>
+              <a:defRPr>
+                <a:solidFill>
+                  <a:schemeClr val="tx1"/>
+                </a:solidFill>
+                <a:latin typeface="Calibri" panose="020F0502020204030204" pitchFamily="34" charset="0"/>
+              </a:defRPr>
+            </a:lvl1pPr>
+            <a:lvl2pPr marL="742950" indent="-285750">
+              <a:defRPr>
+                <a:solidFill>
+                  <a:schemeClr val="tx1"/>
+                </a:solidFill>
+                <a:latin typeface="Calibri" panose="020F0502020204030204" pitchFamily="34" charset="0"/>
+              </a:defRPr>
+            </a:lvl2pPr>
+            <a:lvl3pPr marL="1143000" indent="-228600">
+              <a:defRPr>
+                <a:solidFill>
+                  <a:schemeClr val="tx1"/>
+                </a:solidFill>
+                <a:latin typeface="Calibri" panose="020F0502020204030204" pitchFamily="34" charset="0"/>
+              </a:defRPr>
+            </a:lvl3pPr>
+            <a:lvl4pPr marL="1600200" indent="-228600">
+              <a:defRPr>
+                <a:solidFill>
+                  <a:schemeClr val="tx1"/>
+                </a:solidFill>
+                <a:latin typeface="Calibri" panose="020F0502020204030204" pitchFamily="34" charset="0"/>
+              </a:defRPr>
+            </a:lvl4pPr>
+            <a:lvl5pPr marL="2057400" indent="-228600">
+              <a:defRPr>
+                <a:solidFill>
+                  <a:schemeClr val="tx1"/>
+                </a:solidFill>
+                <a:latin typeface="Calibri" panose="020F0502020204030204" pitchFamily="34" charset="0"/>
+              </a:defRPr>
+            </a:lvl5pPr>
+            <a:lvl6pPr marL="2514600" indent="-228600" eaLnBrk="0" fontAlgn="base" hangingPunct="0">
+              <a:spcBef>
+                <a:spcPct val="0"/>
+              </a:spcBef>
+              <a:spcAft>
+                <a:spcPct val="0"/>
+              </a:spcAft>
+              <a:defRPr>
+                <a:solidFill>
+                  <a:schemeClr val="tx1"/>
+                </a:solidFill>
+                <a:latin typeface="Calibri" panose="020F0502020204030204" pitchFamily="34" charset="0"/>
+              </a:defRPr>
+            </a:lvl6pPr>
+            <a:lvl7pPr marL="2971800" indent="-228600" eaLnBrk="0" fontAlgn="base" hangingPunct="0">
+              <a:spcBef>
+                <a:spcPct val="0"/>
+              </a:spcBef>
+              <a:spcAft>
+                <a:spcPct val="0"/>
+              </a:spcAft>
+              <a:defRPr>
+                <a:solidFill>
+                  <a:schemeClr val="tx1"/>
+                </a:solidFill>
+                <a:latin typeface="Calibri" panose="020F0502020204030204" pitchFamily="34" charset="0"/>
+              </a:defRPr>
+            </a:lvl7pPr>
+            <a:lvl8pPr marL="3429000" indent="-228600" eaLnBrk="0" fontAlgn="base" hangingPunct="0">
+              <a:spcBef>
+                <a:spcPct val="0"/>
+              </a:spcBef>
+              <a:spcAft>
+                <a:spcPct val="0"/>
+              </a:spcAft>
+              <a:defRPr>
+                <a:solidFill>
+                  <a:schemeClr val="tx1"/>
+                </a:solidFill>
+                <a:latin typeface="Calibri" panose="020F0502020204030204" pitchFamily="34" charset="0"/>
+              </a:defRPr>
+            </a:lvl8pPr>
+            <a:lvl9pPr marL="3886200" indent="-228600" eaLnBrk="0" fontAlgn="base" hangingPunct="0">
+              <a:spcBef>
+                <a:spcPct val="0"/>
+              </a:spcBef>
+              <a:spcAft>
+                <a:spcPct val="0"/>
+              </a:spcAft>
+              <a:defRPr>
+                <a:solidFill>
+                  <a:schemeClr val="tx1"/>
+                </a:solidFill>
+                <a:latin typeface="Calibri" panose="020F0502020204030204" pitchFamily="34" charset="0"/>
+              </a:defRPr>
+            </a:lvl9pPr>
+          </a:lstStyle>
+          <a:p>
+            <a:pPr algn="ctr" eaLnBrk="1" hangingPunct="1"/>
+            <a:r>
+              <a:rPr lang="en-US" altLang="en-US" sz="1200" dirty="0">
+                <a:latin typeface="Arial" panose="020B0604020202020204" pitchFamily="34" charset="0"/>
+                <a:ea typeface="Amazon Ember" panose="020B0603020204020204" pitchFamily="34" charset="0"/>
+                <a:cs typeface="Arial" panose="020B0604020202020204" pitchFamily="34" charset="0"/>
+              </a:rPr>
+              <a:t>Amazon S3 bucket</a:t>
+            </a:r>
+          </a:p>
+        </p:txBody>
+      </p:sp>
     </p:spTree>
     <p:extLst>
       <p:ext uri="{BB962C8B-B14F-4D97-AF65-F5344CB8AC3E}">

</xml_diff>

<commit_message>
Added Salesforce object bullets
</commit_message>
<xml_diff>
--- a/docs/deployment_guide/images/salesforce-connect-appsync-rds-postgresql-architecture-diagram.pptx
+++ b/docs/deployment_guide/images/salesforce-connect-appsync-rds-postgresql-architecture-diagram.pptx
@@ -5443,7 +5443,7 @@
                 <a:ea typeface="Amazon Ember" panose="020B0603020204020204" pitchFamily="34" charset="0"/>
                 <a:cs typeface="Arial" panose="020B0604020202020204" pitchFamily="34" charset="0"/>
               </a:rPr>
-              <a:t>Resolver Lambda function</a:t>
+              <a:t>RDS resolver Lambda function</a:t>
             </a:r>
           </a:p>
         </p:txBody>
@@ -8779,7 +8779,7 @@
                 <a:ea typeface="Amazon Ember" panose="020B0603020204020204" pitchFamily="34" charset="0"/>
                 <a:cs typeface="Arial" panose="020B0604020202020204" pitchFamily="34" charset="0"/>
               </a:rPr>
-              <a:t>Resolver Lambda function</a:t>
+              <a:t>RDS resolver Lambda function</a:t>
             </a:r>
           </a:p>
         </p:txBody>

</xml_diff>